<commit_message>
added unit 3 and 7 slides
</commit_message>
<xml_diff>
--- a/Unit 3/inputoutput.pptx
+++ b/Unit 3/inputoutput.pptx
@@ -5,7 +5,7 @@
     <p:sldMasterId id="2147483648" r:id="rId1"/>
   </p:sldMasterIdLst>
   <p:notesMasterIdLst>
-    <p:notesMasterId r:id="rId32"/>
+    <p:notesMasterId r:id="rId33"/>
   </p:notesMasterIdLst>
   <p:sldIdLst>
     <p:sldId id="256" r:id="rId2"/>
@@ -38,6 +38,7 @@
     <p:sldId id="285" r:id="rId29"/>
     <p:sldId id="286" r:id="rId30"/>
     <p:sldId id="280" r:id="rId31"/>
+    <p:sldId id="287" r:id="rId32"/>
   </p:sldIdLst>
   <p:sldSz cx="9144000" cy="6858000" type="screen4x3"/>
   <p:notesSz cx="6858000" cy="9144000"/>
@@ -221,7 +222,7 @@
           <a:p>
             <a:fld id="{89CC0E48-DD31-4235-BF56-E8D74A566AFE}" type="datetimeFigureOut">
               <a:rPr lang="en-US" smtClean="0"/>
-              <a:t>1/9/2016</a:t>
+              <a:t>1/10/2016</a:t>
             </a:fld>
             <a:endParaRPr lang="en-US"/>
           </a:p>
@@ -755,7 +756,7 @@
             <a:fld id="{1D8BD707-D9CF-40AE-B4C6-C98DA3205C09}" type="datetimeFigureOut">
               <a:rPr lang="en-US" smtClean="0"/>
               <a:pPr/>
-              <a:t>1/9/2016</a:t>
+              <a:t>1/10/2016</a:t>
             </a:fld>
             <a:endParaRPr lang="en-US"/>
           </a:p>
@@ -922,7 +923,7 @@
             <a:fld id="{1D8BD707-D9CF-40AE-B4C6-C98DA3205C09}" type="datetimeFigureOut">
               <a:rPr lang="en-US" smtClean="0"/>
               <a:pPr/>
-              <a:t>1/9/2016</a:t>
+              <a:t>1/10/2016</a:t>
             </a:fld>
             <a:endParaRPr lang="en-US"/>
           </a:p>
@@ -1099,7 +1100,7 @@
             <a:fld id="{1D8BD707-D9CF-40AE-B4C6-C98DA3205C09}" type="datetimeFigureOut">
               <a:rPr lang="en-US" smtClean="0"/>
               <a:pPr/>
-              <a:t>1/9/2016</a:t>
+              <a:t>1/10/2016</a:t>
             </a:fld>
             <a:endParaRPr lang="en-US"/>
           </a:p>
@@ -1266,7 +1267,7 @@
             <a:fld id="{1D8BD707-D9CF-40AE-B4C6-C98DA3205C09}" type="datetimeFigureOut">
               <a:rPr lang="en-US" smtClean="0"/>
               <a:pPr/>
-              <a:t>1/9/2016</a:t>
+              <a:t>1/10/2016</a:t>
             </a:fld>
             <a:endParaRPr lang="en-US"/>
           </a:p>
@@ -1509,7 +1510,7 @@
             <a:fld id="{1D8BD707-D9CF-40AE-B4C6-C98DA3205C09}" type="datetimeFigureOut">
               <a:rPr lang="en-US" smtClean="0"/>
               <a:pPr/>
-              <a:t>1/9/2016</a:t>
+              <a:t>1/10/2016</a:t>
             </a:fld>
             <a:endParaRPr lang="en-US"/>
           </a:p>
@@ -1794,7 +1795,7 @@
             <a:fld id="{1D8BD707-D9CF-40AE-B4C6-C98DA3205C09}" type="datetimeFigureOut">
               <a:rPr lang="en-US" smtClean="0"/>
               <a:pPr/>
-              <a:t>1/9/2016</a:t>
+              <a:t>1/10/2016</a:t>
             </a:fld>
             <a:endParaRPr lang="en-US"/>
           </a:p>
@@ -2213,7 +2214,7 @@
             <a:fld id="{1D8BD707-D9CF-40AE-B4C6-C98DA3205C09}" type="datetimeFigureOut">
               <a:rPr lang="en-US" smtClean="0"/>
               <a:pPr/>
-              <a:t>1/9/2016</a:t>
+              <a:t>1/10/2016</a:t>
             </a:fld>
             <a:endParaRPr lang="en-US"/>
           </a:p>
@@ -2328,7 +2329,7 @@
             <a:fld id="{1D8BD707-D9CF-40AE-B4C6-C98DA3205C09}" type="datetimeFigureOut">
               <a:rPr lang="en-US" smtClean="0"/>
               <a:pPr/>
-              <a:t>1/9/2016</a:t>
+              <a:t>1/10/2016</a:t>
             </a:fld>
             <a:endParaRPr lang="en-US"/>
           </a:p>
@@ -2420,7 +2421,7 @@
             <a:fld id="{1D8BD707-D9CF-40AE-B4C6-C98DA3205C09}" type="datetimeFigureOut">
               <a:rPr lang="en-US" smtClean="0"/>
               <a:pPr/>
-              <a:t>1/9/2016</a:t>
+              <a:t>1/10/2016</a:t>
             </a:fld>
             <a:endParaRPr lang="en-US"/>
           </a:p>
@@ -2694,7 +2695,7 @@
             <a:fld id="{1D8BD707-D9CF-40AE-B4C6-C98DA3205C09}" type="datetimeFigureOut">
               <a:rPr lang="en-US" smtClean="0"/>
               <a:pPr/>
-              <a:t>1/9/2016</a:t>
+              <a:t>1/10/2016</a:t>
             </a:fld>
             <a:endParaRPr lang="en-US"/>
           </a:p>
@@ -2944,7 +2945,7 @@
             <a:fld id="{1D8BD707-D9CF-40AE-B4C6-C98DA3205C09}" type="datetimeFigureOut">
               <a:rPr lang="en-US" smtClean="0"/>
               <a:pPr/>
-              <a:t>1/9/2016</a:t>
+              <a:t>1/10/2016</a:t>
             </a:fld>
             <a:endParaRPr lang="en-US"/>
           </a:p>
@@ -3154,7 +3155,7 @@
             <a:fld id="{1D8BD707-D9CF-40AE-B4C6-C98DA3205C09}" type="datetimeFigureOut">
               <a:rPr lang="en-US" smtClean="0"/>
               <a:pPr/>
-              <a:t>1/9/2016</a:t>
+              <a:t>1/10/2016</a:t>
             </a:fld>
             <a:endParaRPr lang="en-US"/>
           </a:p>
@@ -4859,7 +4860,6 @@
               <a:rPr lang="en-US" dirty="0"/>
               <a:t>some versions of scanf() support the following conversion specifications for strings:-</a:t>
             </a:r>
-            <a:endParaRPr lang="en-US" dirty="0"/>
           </a:p>
           <a:p>
             <a:pPr marL="0" indent="0">
@@ -5019,7 +5019,6 @@
               <a:rPr lang="en-US" dirty="0"/>
               <a:t>&gt;</a:t>
             </a:r>
-            <a:endParaRPr lang="en-US" dirty="0"/>
           </a:p>
           <a:p>
             <a:pPr marL="0" indent="0">
@@ -5054,7 +5053,6 @@
               <a:rPr lang="en-US" dirty="0"/>
               <a:t>main(){</a:t>
             </a:r>
-            <a:endParaRPr lang="en-US" dirty="0"/>
           </a:p>
           <a:p>
             <a:pPr marL="400050" lvl="1" indent="0">
@@ -5064,7 +5062,6 @@
               <a:rPr lang="en-US" dirty="0"/>
               <a:t>char string[10];</a:t>
             </a:r>
-            <a:endParaRPr lang="en-US" dirty="0"/>
           </a:p>
           <a:p>
             <a:pPr marL="400050" lvl="1" indent="0">
@@ -5074,7 +5071,6 @@
               <a:rPr lang="en-US" dirty="0"/>
               <a:t>printf("Enter Your Name in uppercase:");</a:t>
             </a:r>
-            <a:endParaRPr lang="en-US" dirty="0"/>
           </a:p>
           <a:p>
             <a:pPr marL="400050" lvl="1" indent="0">
@@ -5096,7 +5092,6 @@
               <a:rPr lang="en-US" dirty="0"/>
               <a:t>",string);</a:t>
             </a:r>
-            <a:endParaRPr lang="en-US" dirty="0"/>
           </a:p>
           <a:p>
             <a:pPr marL="400050" lvl="1" indent="0">
@@ -5114,7 +5109,6 @@
               <a:rPr lang="en-US" dirty="0"/>
               <a:t>);</a:t>
             </a:r>
-            <a:endParaRPr lang="en-US" dirty="0"/>
           </a:p>
           <a:p>
             <a:pPr marL="400050" lvl="1" indent="0">
@@ -5128,7 +5122,6 @@
               <a:rPr lang="en-US" dirty="0"/>
               <a:t>();</a:t>
             </a:r>
-            <a:endParaRPr lang="en-US" dirty="0"/>
           </a:p>
           <a:p>
             <a:pPr marL="0" indent="0">
@@ -5138,7 +5131,6 @@
               <a:rPr lang="en-US" dirty="0"/>
               <a:t>}</a:t>
             </a:r>
-            <a:endParaRPr lang="en-US" dirty="0"/>
           </a:p>
           <a:p>
             <a:pPr marL="0" indent="0">
@@ -5287,11 +5279,7 @@
             </a:pPr>
             <a:r>
               <a:rPr lang="en-US" dirty="0" smtClean="0"/>
-              <a:t>scanf</a:t>
-            </a:r>
-            <a:r>
-              <a:rPr lang="en-US" dirty="0" smtClean="0"/>
-              <a:t>("%[</a:t>
+              <a:t>scanf("%[</a:t>
             </a:r>
             <a:r>
               <a:rPr lang="en-US" dirty="0" smtClean="0">
@@ -5832,11 +5820,6 @@
               </a:rPr>
               <a:t> n)</a:t>
             </a:r>
-            <a:endParaRPr lang="en-US" sz="2400" dirty="0">
-              <a:solidFill>
-                <a:srgbClr val="FF0000"/>
-              </a:solidFill>
-            </a:endParaRPr>
           </a:p>
           <a:p>
             <a:pPr fontAlgn="base"/>
@@ -6788,7 +6771,125 @@
           <a:bodyPr/>
           <a:lstStyle/>
           <a:p>
-            <a:endParaRPr lang="en-US"/>
+            <a:r>
+              <a:rPr lang="en-US" b="1" dirty="0" err="1" smtClean="0"/>
+              <a:t>getch</a:t>
+            </a:r>
+            <a:r>
+              <a:rPr lang="en-US" b="1" dirty="0" smtClean="0"/>
+              <a:t>()</a:t>
+            </a:r>
+            <a:r>
+              <a:rPr lang="en-US" dirty="0" smtClean="0"/>
+              <a:t> and </a:t>
+            </a:r>
+            <a:r>
+              <a:rPr lang="en-US" b="1" dirty="0" err="1" smtClean="0"/>
+              <a:t>getche</a:t>
+            </a:r>
+            <a:r>
+              <a:rPr lang="en-US" b="1" dirty="0" smtClean="0"/>
+              <a:t>()</a:t>
+            </a:r>
+          </a:p>
+          <a:p>
+            <a:pPr lvl="1"/>
+            <a:r>
+              <a:rPr lang="en-US" dirty="0" smtClean="0"/>
+              <a:t>Reads single character the instant it is typed without waiting for the enter key to be hit.</a:t>
+            </a:r>
+          </a:p>
+          <a:p>
+            <a:pPr lvl="1"/>
+            <a:r>
+              <a:rPr lang="en-US" dirty="0" err="1" smtClean="0"/>
+              <a:t>getch</a:t>
+            </a:r>
+            <a:r>
+              <a:rPr lang="en-US" dirty="0" smtClean="0"/>
+              <a:t>() doesn’t print the character entered</a:t>
+            </a:r>
+          </a:p>
+          <a:p>
+            <a:pPr lvl="1"/>
+            <a:r>
+              <a:rPr lang="en-US" dirty="0" err="1" smtClean="0"/>
+              <a:t>getche</a:t>
+            </a:r>
+            <a:r>
+              <a:rPr lang="en-US" dirty="0" smtClean="0"/>
+              <a:t>() displays the character when entered.</a:t>
+            </a:r>
+          </a:p>
+          <a:p>
+            <a:pPr lvl="1"/>
+            <a:r>
+              <a:rPr lang="en-US" dirty="0" smtClean="0"/>
+              <a:t>General form</a:t>
+            </a:r>
+          </a:p>
+          <a:p>
+            <a:pPr lvl="2"/>
+            <a:r>
+              <a:rPr lang="en-US" dirty="0" err="1" smtClean="0"/>
+              <a:t>character_variable</a:t>
+            </a:r>
+            <a:r>
+              <a:rPr lang="en-US" dirty="0" smtClean="0"/>
+              <a:t>=</a:t>
+            </a:r>
+            <a:r>
+              <a:rPr lang="en-US" dirty="0" err="1" smtClean="0"/>
+              <a:t>getch</a:t>
+            </a:r>
+            <a:r>
+              <a:rPr lang="en-US" dirty="0" smtClean="0"/>
+              <a:t>();</a:t>
+            </a:r>
+          </a:p>
+          <a:p>
+            <a:pPr lvl="2"/>
+            <a:r>
+              <a:rPr lang="en-US" dirty="0" err="1" smtClean="0"/>
+              <a:t>character_variable</a:t>
+            </a:r>
+            <a:r>
+              <a:rPr lang="en-US" dirty="0" smtClean="0"/>
+              <a:t>=</a:t>
+            </a:r>
+            <a:r>
+              <a:rPr lang="en-US" dirty="0" err="1" smtClean="0"/>
+              <a:t>getche</a:t>
+            </a:r>
+            <a:r>
+              <a:rPr lang="en-US" dirty="0" smtClean="0"/>
+              <a:t>();</a:t>
+            </a:r>
+            <a:endParaRPr lang="en-US" dirty="0"/>
+          </a:p>
+          <a:p>
+            <a:pPr lvl="1"/>
+            <a:r>
+              <a:rPr lang="en-US" dirty="0" smtClean="0"/>
+              <a:t>In both functions, the character typed is assigned to the </a:t>
+            </a:r>
+            <a:r>
+              <a:rPr lang="en-US" b="1" dirty="0" smtClean="0"/>
+              <a:t>char</a:t>
+            </a:r>
+            <a:r>
+              <a:rPr lang="en-US" dirty="0" smtClean="0"/>
+              <a:t> type variable </a:t>
+            </a:r>
+            <a:r>
+              <a:rPr lang="en-US" dirty="0" err="1" smtClean="0"/>
+              <a:t>character_variable</a:t>
+            </a:r>
+            <a:r>
+              <a:rPr lang="en-US" dirty="0"/>
+              <a:t>.</a:t>
+            </a:r>
+            <a:endParaRPr lang="en-US" dirty="0" smtClean="0"/>
           </a:p>
         </p:txBody>
       </p:sp>
@@ -6831,39 +6932,118 @@
       </p:grpSpPr>
       <p:sp>
         <p:nvSpPr>
-          <p:cNvPr id="2" name="Title 1"/>
-          <p:cNvSpPr>
-            <a:spLocks noGrp="1"/>
-          </p:cNvSpPr>
-          <p:nvPr>
-            <p:ph type="title"/>
-          </p:nvPr>
-        </p:nvSpPr>
-        <p:spPr/>
+          <p:cNvPr id="3" name="Content Placeholder 2"/>
+          <p:cNvSpPr>
+            <a:spLocks noGrp="1"/>
+          </p:cNvSpPr>
+          <p:nvPr>
+            <p:ph idx="1"/>
+          </p:nvPr>
+        </p:nvSpPr>
+        <p:spPr>
+          <a:xfrm>
+            <a:off x="457200" y="533400"/>
+            <a:ext cx="8229600" cy="5592763"/>
+          </a:xfrm>
+        </p:spPr>
         <p:txBody>
           <a:bodyPr/>
           <a:lstStyle/>
           <a:p>
-            <a:endParaRPr lang="en-US"/>
-          </a:p>
-        </p:txBody>
-      </p:sp>
-      <p:sp>
-        <p:nvSpPr>
-          <p:cNvPr id="3" name="Content Placeholder 2"/>
-          <p:cNvSpPr>
-            <a:spLocks noGrp="1"/>
-          </p:cNvSpPr>
-          <p:nvPr>
-            <p:ph idx="1"/>
-          </p:nvPr>
-        </p:nvSpPr>
-        <p:spPr/>
-        <p:txBody>
-          <a:bodyPr/>
-          <a:lstStyle/>
-          <a:p>
-            <a:endParaRPr lang="en-US"/>
+            <a:r>
+              <a:rPr lang="en-US" b="1" dirty="0" err="1"/>
+              <a:t>putch</a:t>
+            </a:r>
+            <a:r>
+              <a:rPr lang="en-US" b="1" dirty="0"/>
+              <a:t>()</a:t>
+            </a:r>
+          </a:p>
+          <a:p>
+            <a:pPr lvl="1"/>
+            <a:r>
+              <a:rPr lang="en-US" dirty="0" smtClean="0"/>
+              <a:t>The function </a:t>
+            </a:r>
+            <a:r>
+              <a:rPr lang="en-US" dirty="0" err="1" smtClean="0"/>
+              <a:t>putch</a:t>
+            </a:r>
+            <a:r>
+              <a:rPr lang="en-US" dirty="0" smtClean="0"/>
+              <a:t>() prints a character onto the screen</a:t>
+            </a:r>
+          </a:p>
+          <a:p>
+            <a:pPr lvl="1"/>
+            <a:r>
+              <a:rPr lang="en-US" dirty="0" smtClean="0"/>
+              <a:t>General form</a:t>
+            </a:r>
+          </a:p>
+          <a:p>
+            <a:pPr lvl="2"/>
+            <a:r>
+              <a:rPr lang="en-US" dirty="0" err="1" smtClean="0"/>
+              <a:t>putch</a:t>
+            </a:r>
+            <a:r>
+              <a:rPr lang="en-US" dirty="0" smtClean="0"/>
+              <a:t>(</a:t>
+            </a:r>
+            <a:r>
+              <a:rPr lang="en-US" dirty="0" err="1" smtClean="0"/>
+              <a:t>character_variable</a:t>
+            </a:r>
+            <a:r>
+              <a:rPr lang="en-US" dirty="0" smtClean="0"/>
+              <a:t>);</a:t>
+            </a:r>
+          </a:p>
+          <a:p>
+            <a:pPr lvl="1"/>
+            <a:r>
+              <a:rPr lang="en-US" dirty="0" smtClean="0"/>
+              <a:t>Character variable is a char type.</a:t>
+            </a:r>
+          </a:p>
+          <a:p>
+            <a:pPr marL="457200" lvl="1" indent="0">
+              <a:buNone/>
+            </a:pPr>
+            <a:endParaRPr lang="en-US" dirty="0"/>
+          </a:p>
+          <a:p>
+            <a:pPr marL="457200" lvl="1" indent="0">
+              <a:buNone/>
+            </a:pPr>
+            <a:endParaRPr lang="en-US" dirty="0" smtClean="0"/>
+          </a:p>
+          <a:p>
+            <a:pPr marL="457200" lvl="1" indent="0">
+              <a:buNone/>
+            </a:pPr>
+            <a:r>
+              <a:rPr lang="en-US" dirty="0" smtClean="0">
+                <a:solidFill>
+                  <a:srgbClr val="FF0000"/>
+                </a:solidFill>
+              </a:rPr>
+              <a:t>NOTE: These three functions are defined under the standard library functions </a:t>
+            </a:r>
+            <a:r>
+              <a:rPr lang="en-US" b="1" dirty="0" err="1" smtClean="0">
+                <a:solidFill>
+                  <a:srgbClr val="FF0000"/>
+                </a:solidFill>
+              </a:rPr>
+              <a:t>conio.h</a:t>
+            </a:r>
+            <a:endParaRPr lang="en-US" b="1" dirty="0">
+              <a:solidFill>
+                <a:srgbClr val="FF0000"/>
+              </a:solidFill>
+            </a:endParaRPr>
           </a:p>
         </p:txBody>
       </p:sp>
@@ -6906,39 +7086,181 @@
       </p:grpSpPr>
       <p:sp>
         <p:nvSpPr>
-          <p:cNvPr id="2" name="Title 1"/>
-          <p:cNvSpPr>
-            <a:spLocks noGrp="1"/>
-          </p:cNvSpPr>
-          <p:nvPr>
-            <p:ph type="title"/>
-          </p:nvPr>
-        </p:nvSpPr>
-        <p:spPr/>
-        <p:txBody>
-          <a:bodyPr/>
+          <p:cNvPr id="3" name="Content Placeholder 2"/>
+          <p:cNvSpPr>
+            <a:spLocks noGrp="1"/>
+          </p:cNvSpPr>
+          <p:nvPr>
+            <p:ph idx="1"/>
+          </p:nvPr>
+        </p:nvSpPr>
+        <p:spPr>
+          <a:xfrm>
+            <a:off x="457200" y="457200"/>
+            <a:ext cx="8229600" cy="5668963"/>
+          </a:xfrm>
+        </p:spPr>
+        <p:txBody>
+          <a:bodyPr>
+            <a:normAutofit fontScale="92500" lnSpcReduction="20000"/>
+          </a:bodyPr>
           <a:lstStyle/>
           <a:p>
-            <a:endParaRPr lang="en-US"/>
-          </a:p>
-        </p:txBody>
-      </p:sp>
-      <p:sp>
-        <p:nvSpPr>
-          <p:cNvPr id="3" name="Content Placeholder 2"/>
-          <p:cNvSpPr>
-            <a:spLocks noGrp="1"/>
-          </p:cNvSpPr>
-          <p:nvPr>
-            <p:ph idx="1"/>
-          </p:nvPr>
-        </p:nvSpPr>
-        <p:spPr/>
-        <p:txBody>
-          <a:bodyPr/>
-          <a:lstStyle/>
-          <a:p>
-            <a:endParaRPr lang="en-US"/>
+            <a:pPr marL="0" indent="0">
+              <a:buNone/>
+            </a:pPr>
+            <a:r>
+              <a:rPr lang="en-US" b="1" dirty="0"/>
+              <a:t>void main(){</a:t>
+            </a:r>
+          </a:p>
+          <a:p>
+            <a:pPr marL="400050" lvl="1" indent="0">
+              <a:buNone/>
+            </a:pPr>
+            <a:r>
+              <a:rPr lang="en-US" b="1" dirty="0"/>
+              <a:t>char ch1, ch2;</a:t>
+            </a:r>
+          </a:p>
+          <a:p>
+            <a:pPr marL="400050" lvl="1" indent="0">
+              <a:buNone/>
+            </a:pPr>
+            <a:r>
+              <a:rPr lang="en-US" dirty="0"/>
+              <a:t>clrscr();</a:t>
+            </a:r>
+          </a:p>
+          <a:p>
+            <a:pPr marL="400050" lvl="1" indent="0">
+              <a:buNone/>
+            </a:pPr>
+            <a:r>
+              <a:rPr lang="en-US" b="1" dirty="0"/>
+              <a:t>printf("Enter 1st character: ");</a:t>
+            </a:r>
+          </a:p>
+          <a:p>
+            <a:pPr marL="400050" lvl="1" indent="0">
+              <a:buNone/>
+            </a:pPr>
+            <a:r>
+              <a:rPr lang="en-US" dirty="0"/>
+              <a:t>ch1=</a:t>
+            </a:r>
+            <a:r>
+              <a:rPr lang="en-US" b="1" dirty="0" err="1"/>
+              <a:t>getch</a:t>
+            </a:r>
+            <a:r>
+              <a:rPr lang="en-US" b="1" dirty="0"/>
+              <a:t>();</a:t>
+            </a:r>
+          </a:p>
+          <a:p>
+            <a:pPr marL="400050" lvl="1" indent="0">
+              <a:buNone/>
+            </a:pPr>
+            <a:r>
+              <a:rPr lang="pt-BR" b="1" dirty="0"/>
+              <a:t>printf("\n Enter 2nd character");</a:t>
+            </a:r>
+          </a:p>
+          <a:p>
+            <a:pPr marL="400050" lvl="1" indent="0">
+              <a:buNone/>
+            </a:pPr>
+            <a:r>
+              <a:rPr lang="en-US" dirty="0"/>
+              <a:t>ch2=</a:t>
+            </a:r>
+            <a:r>
+              <a:rPr lang="en-US" b="1" dirty="0" err="1"/>
+              <a:t>getche</a:t>
+            </a:r>
+            <a:r>
+              <a:rPr lang="en-US" b="1" dirty="0"/>
+              <a:t>();</a:t>
+            </a:r>
+          </a:p>
+          <a:p>
+            <a:pPr marL="400050" lvl="1" indent="0">
+              <a:buNone/>
+            </a:pPr>
+            <a:r>
+              <a:rPr lang="en-US" b="1" dirty="0"/>
+              <a:t>printf("\n first character: ");</a:t>
+            </a:r>
+          </a:p>
+          <a:p>
+            <a:pPr marL="400050" lvl="1" indent="0">
+              <a:buNone/>
+            </a:pPr>
+            <a:r>
+              <a:rPr lang="en-US" b="1" dirty="0" err="1" smtClean="0"/>
+              <a:t>putch</a:t>
+            </a:r>
+            <a:r>
+              <a:rPr lang="en-US" b="1" dirty="0" smtClean="0"/>
+              <a:t>(ch1</a:t>
+            </a:r>
+            <a:r>
+              <a:rPr lang="en-US" b="1" dirty="0"/>
+              <a:t>);</a:t>
+            </a:r>
+          </a:p>
+          <a:p>
+            <a:pPr marL="400050" lvl="1" indent="0">
+              <a:buNone/>
+            </a:pPr>
+            <a:r>
+              <a:rPr lang="en-US" b="1" dirty="0"/>
+              <a:t>printf("\</a:t>
+            </a:r>
+            <a:r>
+              <a:rPr lang="en-US" b="1" dirty="0" err="1"/>
+              <a:t>nSecond</a:t>
+            </a:r>
+            <a:r>
+              <a:rPr lang="en-US" b="1" dirty="0"/>
+              <a:t> character: ");</a:t>
+            </a:r>
+          </a:p>
+          <a:p>
+            <a:pPr marL="400050" lvl="1" indent="0">
+              <a:buNone/>
+            </a:pPr>
+            <a:r>
+              <a:rPr lang="en-US" b="1" dirty="0" err="1"/>
+              <a:t>putch</a:t>
+            </a:r>
+            <a:r>
+              <a:rPr lang="en-US" b="1" dirty="0"/>
+              <a:t>(ch2);</a:t>
+            </a:r>
+          </a:p>
+          <a:p>
+            <a:pPr marL="400050" lvl="1" indent="0">
+              <a:buNone/>
+            </a:pPr>
+            <a:r>
+              <a:rPr lang="en-US" b="1" dirty="0" err="1"/>
+              <a:t>getch</a:t>
+            </a:r>
+            <a:r>
+              <a:rPr lang="en-US" b="1" dirty="0"/>
+              <a:t>();</a:t>
+            </a:r>
+          </a:p>
+          <a:p>
+            <a:pPr marL="0" indent="0">
+              <a:buNone/>
+            </a:pPr>
+            <a:r>
+              <a:rPr lang="en-US" dirty="0"/>
+              <a:t>}</a:t>
+            </a:r>
           </a:p>
         </p:txBody>
       </p:sp>
@@ -6981,39 +7303,133 @@
       </p:grpSpPr>
       <p:sp>
         <p:nvSpPr>
-          <p:cNvPr id="2" name="Title 1"/>
-          <p:cNvSpPr>
-            <a:spLocks noGrp="1"/>
-          </p:cNvSpPr>
-          <p:nvPr>
-            <p:ph type="title"/>
-          </p:nvPr>
-        </p:nvSpPr>
-        <p:spPr/>
+          <p:cNvPr id="3" name="Content Placeholder 2"/>
+          <p:cNvSpPr>
+            <a:spLocks noGrp="1"/>
+          </p:cNvSpPr>
+          <p:nvPr>
+            <p:ph idx="1"/>
+          </p:nvPr>
+        </p:nvSpPr>
+        <p:spPr>
+          <a:xfrm>
+            <a:off x="457200" y="457200"/>
+            <a:ext cx="8229600" cy="5668963"/>
+          </a:xfrm>
+        </p:spPr>
         <p:txBody>
           <a:bodyPr/>
           <a:lstStyle/>
           <a:p>
-            <a:endParaRPr lang="en-US"/>
-          </a:p>
-        </p:txBody>
-      </p:sp>
-      <p:sp>
-        <p:nvSpPr>
-          <p:cNvPr id="3" name="Content Placeholder 2"/>
-          <p:cNvSpPr>
-            <a:spLocks noGrp="1"/>
-          </p:cNvSpPr>
-          <p:nvPr>
-            <p:ph idx="1"/>
-          </p:nvPr>
-        </p:nvSpPr>
-        <p:spPr/>
-        <p:txBody>
-          <a:bodyPr/>
-          <a:lstStyle/>
-          <a:p>
-            <a:endParaRPr lang="en-US"/>
+            <a:r>
+              <a:rPr lang="en-US" dirty="0"/>
+              <a:t>g</a:t>
+            </a:r>
+            <a:r>
+              <a:rPr lang="en-US" dirty="0" smtClean="0"/>
+              <a:t>ets() </a:t>
+            </a:r>
+          </a:p>
+          <a:p>
+            <a:pPr lvl="1"/>
+            <a:r>
+              <a:rPr lang="en-US" dirty="0" smtClean="0"/>
+              <a:t>Used to read string of text, containing whitespaces, until a new line character is encountered.</a:t>
+            </a:r>
+          </a:p>
+          <a:p>
+            <a:pPr lvl="1"/>
+            <a:r>
+              <a:rPr lang="en-US" dirty="0" smtClean="0"/>
+              <a:t>General form</a:t>
+            </a:r>
+          </a:p>
+          <a:p>
+            <a:pPr marL="914400" lvl="2" indent="0">
+              <a:buNone/>
+            </a:pPr>
+            <a:r>
+              <a:rPr lang="en-US" b="1" dirty="0" smtClean="0">
+                <a:solidFill>
+                  <a:srgbClr val="FF0000"/>
+                </a:solidFill>
+              </a:rPr>
+              <a:t>gets(</a:t>
+            </a:r>
+            <a:r>
+              <a:rPr lang="en-US" b="1" dirty="0" err="1" smtClean="0">
+                <a:solidFill>
+                  <a:srgbClr val="FF0000"/>
+                </a:solidFill>
+              </a:rPr>
+              <a:t>string_variable</a:t>
+            </a:r>
+            <a:r>
+              <a:rPr lang="en-US" b="1" dirty="0" smtClean="0">
+                <a:solidFill>
+                  <a:srgbClr val="FF0000"/>
+                </a:solidFill>
+              </a:rPr>
+              <a:t>);</a:t>
+            </a:r>
+          </a:p>
+          <a:p>
+            <a:pPr lvl="2"/>
+            <a:endParaRPr lang="en-US" dirty="0"/>
+          </a:p>
+          <a:p>
+            <a:r>
+              <a:rPr lang="en-US" dirty="0" smtClean="0"/>
+              <a:t>puts()</a:t>
+            </a:r>
+          </a:p>
+          <a:p>
+            <a:pPr lvl="1"/>
+            <a:r>
+              <a:rPr lang="en-US" dirty="0" smtClean="0"/>
+              <a:t>Used to display the string onto the terminal</a:t>
+            </a:r>
+          </a:p>
+          <a:p>
+            <a:pPr lvl="1"/>
+            <a:r>
+              <a:rPr lang="en-US" dirty="0" smtClean="0"/>
+              <a:t>General form:</a:t>
+            </a:r>
+          </a:p>
+          <a:p>
+            <a:pPr marL="914400" lvl="2" indent="0">
+              <a:buNone/>
+            </a:pPr>
+            <a:r>
+              <a:rPr lang="en-US" b="1" dirty="0" smtClean="0">
+                <a:solidFill>
+                  <a:srgbClr val="FF0000"/>
+                </a:solidFill>
+              </a:rPr>
+              <a:t>puts(</a:t>
+            </a:r>
+            <a:r>
+              <a:rPr lang="en-US" b="1" dirty="0" err="1" smtClean="0">
+                <a:solidFill>
+                  <a:srgbClr val="FF0000"/>
+                </a:solidFill>
+              </a:rPr>
+              <a:t>string_variable</a:t>
+            </a:r>
+            <a:r>
+              <a:rPr lang="en-US" b="1" dirty="0" smtClean="0">
+                <a:solidFill>
+                  <a:srgbClr val="FF0000"/>
+                </a:solidFill>
+              </a:rPr>
+              <a:t>);</a:t>
+            </a:r>
+            <a:endParaRPr lang="en-US" b="1" dirty="0">
+              <a:solidFill>
+                <a:srgbClr val="FF0000"/>
+              </a:solidFill>
+            </a:endParaRPr>
           </a:p>
         </p:txBody>
       </p:sp>
@@ -7218,39 +7634,118 @@
       </p:grpSpPr>
       <p:sp>
         <p:nvSpPr>
-          <p:cNvPr id="2" name="Title 1"/>
-          <p:cNvSpPr>
-            <a:spLocks noGrp="1"/>
-          </p:cNvSpPr>
-          <p:nvPr>
-            <p:ph type="title"/>
-          </p:nvPr>
-        </p:nvSpPr>
-        <p:spPr/>
-        <p:txBody>
-          <a:bodyPr/>
+          <p:cNvPr id="3" name="Content Placeholder 2"/>
+          <p:cNvSpPr>
+            <a:spLocks noGrp="1"/>
+          </p:cNvSpPr>
+          <p:nvPr>
+            <p:ph idx="1"/>
+          </p:nvPr>
+        </p:nvSpPr>
+        <p:spPr>
+          <a:xfrm>
+            <a:off x="457200" y="533400"/>
+            <a:ext cx="8229600" cy="5592763"/>
+          </a:xfrm>
+        </p:spPr>
+        <p:txBody>
+          <a:bodyPr>
+            <a:normAutofit/>
+          </a:bodyPr>
           <a:lstStyle/>
           <a:p>
-            <a:endParaRPr lang="en-US"/>
-          </a:p>
-        </p:txBody>
-      </p:sp>
-      <p:sp>
-        <p:nvSpPr>
-          <p:cNvPr id="3" name="Content Placeholder 2"/>
-          <p:cNvSpPr>
-            <a:spLocks noGrp="1"/>
-          </p:cNvSpPr>
-          <p:nvPr>
-            <p:ph idx="1"/>
-          </p:nvPr>
-        </p:nvSpPr>
-        <p:spPr/>
-        <p:txBody>
-          <a:bodyPr/>
-          <a:lstStyle/>
-          <a:p>
-            <a:endParaRPr lang="en-US"/>
+            <a:pPr marL="0" indent="0">
+              <a:buNone/>
+            </a:pPr>
+            <a:r>
+              <a:rPr lang="en-US" b="1" dirty="0"/>
+              <a:t>void main()</a:t>
+            </a:r>
+          </a:p>
+          <a:p>
+            <a:pPr marL="0" indent="0">
+              <a:buNone/>
+            </a:pPr>
+            <a:r>
+              <a:rPr lang="en-US" dirty="0"/>
+              <a:t>{</a:t>
+            </a:r>
+          </a:p>
+          <a:p>
+            <a:pPr marL="400050" lvl="1" indent="0">
+              <a:buNone/>
+            </a:pPr>
+            <a:r>
+              <a:rPr lang="en-US" b="1" dirty="0"/>
+              <a:t>char name[20];</a:t>
+            </a:r>
+          </a:p>
+          <a:p>
+            <a:pPr marL="400050" lvl="1" indent="0">
+              <a:buNone/>
+            </a:pPr>
+            <a:r>
+              <a:rPr lang="en-US" dirty="0"/>
+              <a:t>clrscr();</a:t>
+            </a:r>
+          </a:p>
+          <a:p>
+            <a:pPr marL="400050" lvl="1" indent="0">
+              <a:buNone/>
+            </a:pPr>
+            <a:r>
+              <a:rPr lang="en-US" b="1" dirty="0"/>
+              <a:t>printf("Enter your name:");</a:t>
+            </a:r>
+          </a:p>
+          <a:p>
+            <a:pPr marL="400050" lvl="1" indent="0">
+              <a:buNone/>
+            </a:pPr>
+            <a:r>
+              <a:rPr lang="en-US" b="1" dirty="0"/>
+              <a:t>gets(name);</a:t>
+            </a:r>
+          </a:p>
+          <a:p>
+            <a:pPr marL="400050" lvl="1" indent="0">
+              <a:buNone/>
+            </a:pPr>
+            <a:r>
+              <a:rPr lang="en-US" b="1" dirty="0"/>
+              <a:t>printf("Your Name is: ");</a:t>
+            </a:r>
+          </a:p>
+          <a:p>
+            <a:pPr marL="400050" lvl="1" indent="0">
+              <a:buNone/>
+            </a:pPr>
+            <a:r>
+              <a:rPr lang="en-US" b="1" dirty="0"/>
+              <a:t>puts(name);</a:t>
+            </a:r>
+          </a:p>
+          <a:p>
+            <a:pPr marL="400050" lvl="1" indent="0">
+              <a:buNone/>
+            </a:pPr>
+            <a:r>
+              <a:rPr lang="en-US" b="1" dirty="0" err="1"/>
+              <a:t>getch</a:t>
+            </a:r>
+            <a:r>
+              <a:rPr lang="en-US" b="1" dirty="0"/>
+              <a:t>();</a:t>
+            </a:r>
+          </a:p>
+          <a:p>
+            <a:pPr marL="0" indent="0">
+              <a:buNone/>
+            </a:pPr>
+            <a:r>
+              <a:rPr lang="en-US" dirty="0"/>
+              <a:t>}</a:t>
+            </a:r>
           </a:p>
         </p:txBody>
       </p:sp>
@@ -7258,6 +7753,90 @@
     <p:extLst>
       <p:ext uri="{BB962C8B-B14F-4D97-AF65-F5344CB8AC3E}">
         <p14:creationId xmlns:p14="http://schemas.microsoft.com/office/powerpoint/2010/main" val="164974610"/>
+      </p:ext>
+    </p:extLst>
+  </p:cSld>
+  <p:clrMapOvr>
+    <a:masterClrMapping/>
+  </p:clrMapOvr>
+  <p:timing>
+    <p:tnLst>
+      <p:par>
+        <p:cTn id="1" dur="indefinite" restart="never" nodeType="tmRoot"/>
+      </p:par>
+    </p:tnLst>
+  </p:timing>
+</p:sld>
+</file>
+
+<file path=ppt/slides/slide31.xml><?xml version="1.0" encoding="utf-8"?>
+<p:sld xmlns:a="http://schemas.openxmlformats.org/drawingml/2006/main" xmlns:r="http://schemas.openxmlformats.org/officeDocument/2006/relationships" xmlns:p="http://schemas.openxmlformats.org/presentationml/2006/main">
+  <p:cSld>
+    <p:spTree>
+      <p:nvGrpSpPr>
+        <p:cNvPr id="1" name=""/>
+        <p:cNvGrpSpPr/>
+        <p:nvPr/>
+      </p:nvGrpSpPr>
+      <p:grpSpPr>
+        <a:xfrm>
+          <a:off x="0" y="0"/>
+          <a:ext cx="0" cy="0"/>
+          <a:chOff x="0" y="0"/>
+          <a:chExt cx="0" cy="0"/>
+        </a:xfrm>
+      </p:grpSpPr>
+      <p:sp>
+        <p:nvSpPr>
+          <p:cNvPr id="2" name="Title 1"/>
+          <p:cNvSpPr>
+            <a:spLocks noGrp="1"/>
+          </p:cNvSpPr>
+          <p:nvPr>
+            <p:ph type="title"/>
+          </p:nvPr>
+        </p:nvSpPr>
+        <p:spPr>
+          <a:xfrm>
+            <a:off x="228600" y="2438400"/>
+            <a:ext cx="8229600" cy="1143000"/>
+          </a:xfrm>
+        </p:spPr>
+        <p:txBody>
+          <a:bodyPr/>
+          <a:lstStyle/>
+          <a:p>
+            <a:r>
+              <a:rPr lang="en-US" dirty="0" smtClean="0"/>
+              <a:t>END</a:t>
+            </a:r>
+            <a:endParaRPr lang="en-US" dirty="0"/>
+          </a:p>
+        </p:txBody>
+      </p:sp>
+      <p:sp>
+        <p:nvSpPr>
+          <p:cNvPr id="3" name="Content Placeholder 2"/>
+          <p:cNvSpPr>
+            <a:spLocks noGrp="1"/>
+          </p:cNvSpPr>
+          <p:nvPr>
+            <p:ph idx="1"/>
+          </p:nvPr>
+        </p:nvSpPr>
+        <p:spPr/>
+        <p:txBody>
+          <a:bodyPr/>
+          <a:lstStyle/>
+          <a:p>
+            <a:endParaRPr lang="en-US" dirty="0"/>
+          </a:p>
+        </p:txBody>
+      </p:sp>
+    </p:spTree>
+    <p:extLst>
+      <p:ext uri="{BB962C8B-B14F-4D97-AF65-F5344CB8AC3E}">
+        <p14:creationId xmlns:p14="http://schemas.microsoft.com/office/powerpoint/2010/main" val="1324979694"/>
       </p:ext>
     </p:extLst>
   </p:cSld>

</xml_diff>

<commit_message>
added footer and slide image
</commit_message>
<xml_diff>
--- a/Unit 3/inputoutput.pptx
+++ b/Unit 3/inputoutput.pptx
@@ -1,6 +1,6 @@
 
 <file path=ppt/presentation.xml><?xml version="1.0" encoding="utf-8"?>
-<p:presentation xmlns:a="http://schemas.openxmlformats.org/drawingml/2006/main" xmlns:r="http://schemas.openxmlformats.org/officeDocument/2006/relationships" xmlns:p="http://schemas.openxmlformats.org/presentationml/2006/main" saveSubsetFonts="1">
+<p:presentation xmlns:a="http://schemas.openxmlformats.org/drawingml/2006/main" xmlns:r="http://schemas.openxmlformats.org/officeDocument/2006/relationships" xmlns:p="http://schemas.openxmlformats.org/presentationml/2006/main" showSpecialPlsOnTitleSld="0" saveSubsetFonts="1">
   <p:sldMasterIdLst>
     <p:sldMasterId id="2147483648" r:id="rId1"/>
   </p:sldMasterIdLst>
@@ -137,6 +137,22 @@
       </a:defRPr>
     </a:lvl9pPr>
   </p:defaultTextStyle>
+  <p:extLst>
+    <p:ext uri="{EFAFB233-063F-42B5-8137-9DF3F51BA10A}">
+      <p15:sldGuideLst xmlns:p15="http://schemas.microsoft.com/office/powerpoint/2012/main">
+        <p15:guide id="1" orient="horz" pos="2160">
+          <p15:clr>
+            <a:srgbClr val="A4A3A4"/>
+          </p15:clr>
+        </p15:guide>
+        <p15:guide id="2" pos="2880">
+          <p15:clr>
+            <a:srgbClr val="A4A3A4"/>
+          </p15:clr>
+        </p15:guide>
+      </p15:sldGuideLst>
+    </p:ext>
+  </p:extLst>
 </p:presentation>
 </file>
 
@@ -222,7 +238,7 @@
           <a:p>
             <a:fld id="{89CC0E48-DD31-4235-BF56-E8D74A566AFE}" type="datetimeFigureOut">
               <a:rPr lang="en-US" smtClean="0"/>
-              <a:t>1/10/2016</a:t>
+              <a:t>2/29/16</a:t>
             </a:fld>
             <a:endParaRPr lang="en-US"/>
           </a:p>
@@ -534,6 +550,90 @@
           <a:bodyPr/>
           <a:lstStyle/>
           <a:p>
+            <a:endParaRPr lang="en-US"/>
+          </a:p>
+        </p:txBody>
+      </p:sp>
+      <p:sp>
+        <p:nvSpPr>
+          <p:cNvPr id="4" name="Slide Number Placeholder 3"/>
+          <p:cNvSpPr>
+            <a:spLocks noGrp="1"/>
+          </p:cNvSpPr>
+          <p:nvPr>
+            <p:ph type="sldNum" sz="quarter" idx="10"/>
+          </p:nvPr>
+        </p:nvSpPr>
+        <p:spPr/>
+        <p:txBody>
+          <a:bodyPr/>
+          <a:lstStyle/>
+          <a:p>
+            <a:fld id="{E826254F-7780-4BA7-AB5C-69D7B334A9ED}" type="slidenum">
+              <a:rPr lang="en-US" smtClean="0"/>
+              <a:t>1</a:t>
+            </a:fld>
+            <a:endParaRPr lang="en-US"/>
+          </a:p>
+        </p:txBody>
+      </p:sp>
+    </p:spTree>
+    <p:extLst>
+      <p:ext uri="{BB962C8B-B14F-4D97-AF65-F5344CB8AC3E}">
+        <p14:creationId xmlns:p14="http://schemas.microsoft.com/office/powerpoint/2010/main" val="1312204944"/>
+      </p:ext>
+    </p:extLst>
+  </p:cSld>
+  <p:clrMapOvr>
+    <a:masterClrMapping/>
+  </p:clrMapOvr>
+</p:notes>
+</file>
+
+<file path=ppt/notesSlides/notesSlide2.xml><?xml version="1.0" encoding="utf-8"?>
+<p:notes xmlns:a="http://schemas.openxmlformats.org/drawingml/2006/main" xmlns:r="http://schemas.openxmlformats.org/officeDocument/2006/relationships" xmlns:p="http://schemas.openxmlformats.org/presentationml/2006/main">
+  <p:cSld>
+    <p:spTree>
+      <p:nvGrpSpPr>
+        <p:cNvPr id="1" name=""/>
+        <p:cNvGrpSpPr/>
+        <p:nvPr/>
+      </p:nvGrpSpPr>
+      <p:grpSpPr>
+        <a:xfrm>
+          <a:off x="0" y="0"/>
+          <a:ext cx="0" cy="0"/>
+          <a:chOff x="0" y="0"/>
+          <a:chExt cx="0" cy="0"/>
+        </a:xfrm>
+      </p:grpSpPr>
+      <p:sp>
+        <p:nvSpPr>
+          <p:cNvPr id="2" name="Slide Image Placeholder 1"/>
+          <p:cNvSpPr>
+            <a:spLocks noGrp="1" noRot="1" noChangeAspect="1"/>
+          </p:cNvSpPr>
+          <p:nvPr>
+            <p:ph type="sldImg"/>
+          </p:nvPr>
+        </p:nvSpPr>
+        <p:spPr/>
+      </p:sp>
+      <p:sp>
+        <p:nvSpPr>
+          <p:cNvPr id="3" name="Notes Placeholder 2"/>
+          <p:cNvSpPr>
+            <a:spLocks noGrp="1"/>
+          </p:cNvSpPr>
+          <p:nvPr>
+            <p:ph type="body" idx="1"/>
+          </p:nvPr>
+        </p:nvSpPr>
+        <p:spPr/>
+        <p:txBody>
+          <a:bodyPr/>
+          <a:lstStyle/>
+          <a:p>
             <a:endParaRPr lang="en-US" dirty="0"/>
           </a:p>
         </p:txBody>
@@ -753,10 +853,9 @@
           <a:bodyPr/>
           <a:lstStyle/>
           <a:p>
-            <a:fld id="{1D8BD707-D9CF-40AE-B4C6-C98DA3205C09}" type="datetimeFigureOut">
-              <a:rPr lang="en-US" smtClean="0"/>
-              <a:pPr/>
-              <a:t>1/10/2016</a:t>
+            <a:fld id="{E2C0F0CF-33BA-8648-A680-82EEA903557A}" type="datetime1">
+              <a:rPr lang="en-US" smtClean="0"/>
+              <a:t>2/29/16</a:t>
             </a:fld>
             <a:endParaRPr lang="en-US"/>
           </a:p>
@@ -777,6 +876,10 @@
           <a:bodyPr/>
           <a:lstStyle/>
           <a:p>
+            <a:r>
+              <a:rPr lang="en-US" smtClean="0"/>
+              <a:t>Ashim Lamichhane</a:t>
+            </a:r>
             <a:endParaRPr lang="en-US"/>
           </a:p>
         </p:txBody>
@@ -920,10 +1023,9 @@
           <a:bodyPr/>
           <a:lstStyle/>
           <a:p>
-            <a:fld id="{1D8BD707-D9CF-40AE-B4C6-C98DA3205C09}" type="datetimeFigureOut">
-              <a:rPr lang="en-US" smtClean="0"/>
-              <a:pPr/>
-              <a:t>1/10/2016</a:t>
+            <a:fld id="{84907DB5-AC10-5640-BBD9-975E6127133F}" type="datetime1">
+              <a:rPr lang="en-US" smtClean="0"/>
+              <a:t>2/29/16</a:t>
             </a:fld>
             <a:endParaRPr lang="en-US"/>
           </a:p>
@@ -944,6 +1046,10 @@
           <a:bodyPr/>
           <a:lstStyle/>
           <a:p>
+            <a:r>
+              <a:rPr lang="en-US" smtClean="0"/>
+              <a:t>Ashim Lamichhane</a:t>
+            </a:r>
             <a:endParaRPr lang="en-US"/>
           </a:p>
         </p:txBody>
@@ -1097,10 +1203,9 @@
           <a:bodyPr/>
           <a:lstStyle/>
           <a:p>
-            <a:fld id="{1D8BD707-D9CF-40AE-B4C6-C98DA3205C09}" type="datetimeFigureOut">
-              <a:rPr lang="en-US" smtClean="0"/>
-              <a:pPr/>
-              <a:t>1/10/2016</a:t>
+            <a:fld id="{CADC5820-C66A-9D45-BB11-511AB46B44EE}" type="datetime1">
+              <a:rPr lang="en-US" smtClean="0"/>
+              <a:t>2/29/16</a:t>
             </a:fld>
             <a:endParaRPr lang="en-US"/>
           </a:p>
@@ -1121,6 +1226,10 @@
           <a:bodyPr/>
           <a:lstStyle/>
           <a:p>
+            <a:r>
+              <a:rPr lang="en-US" smtClean="0"/>
+              <a:t>Ashim Lamichhane</a:t>
+            </a:r>
             <a:endParaRPr lang="en-US"/>
           </a:p>
         </p:txBody>
@@ -1264,10 +1373,9 @@
           <a:bodyPr/>
           <a:lstStyle/>
           <a:p>
-            <a:fld id="{1D8BD707-D9CF-40AE-B4C6-C98DA3205C09}" type="datetimeFigureOut">
-              <a:rPr lang="en-US" smtClean="0"/>
-              <a:pPr/>
-              <a:t>1/10/2016</a:t>
+            <a:fld id="{4E6062FA-3B55-4C41-9EAF-9D45BF66590C}" type="datetime1">
+              <a:rPr lang="en-US" smtClean="0"/>
+              <a:t>2/29/16</a:t>
             </a:fld>
             <a:endParaRPr lang="en-US"/>
           </a:p>
@@ -1288,6 +1396,10 @@
           <a:bodyPr/>
           <a:lstStyle/>
           <a:p>
+            <a:r>
+              <a:rPr lang="en-US" smtClean="0"/>
+              <a:t>Ashim Lamichhane</a:t>
+            </a:r>
             <a:endParaRPr lang="en-US"/>
           </a:p>
         </p:txBody>
@@ -1507,10 +1619,9 @@
           <a:bodyPr/>
           <a:lstStyle/>
           <a:p>
-            <a:fld id="{1D8BD707-D9CF-40AE-B4C6-C98DA3205C09}" type="datetimeFigureOut">
-              <a:rPr lang="en-US" smtClean="0"/>
-              <a:pPr/>
-              <a:t>1/10/2016</a:t>
+            <a:fld id="{79CBA671-AAD1-4246-98AB-C90C57C7E037}" type="datetime1">
+              <a:rPr lang="en-US" smtClean="0"/>
+              <a:t>2/29/16</a:t>
             </a:fld>
             <a:endParaRPr lang="en-US"/>
           </a:p>
@@ -1531,6 +1642,10 @@
           <a:bodyPr/>
           <a:lstStyle/>
           <a:p>
+            <a:r>
+              <a:rPr lang="en-US" smtClean="0"/>
+              <a:t>Ashim Lamichhane</a:t>
+            </a:r>
             <a:endParaRPr lang="en-US"/>
           </a:p>
         </p:txBody>
@@ -1792,10 +1907,9 @@
           <a:bodyPr/>
           <a:lstStyle/>
           <a:p>
-            <a:fld id="{1D8BD707-D9CF-40AE-B4C6-C98DA3205C09}" type="datetimeFigureOut">
-              <a:rPr lang="en-US" smtClean="0"/>
-              <a:pPr/>
-              <a:t>1/10/2016</a:t>
+            <a:fld id="{2BA2F3FF-A57D-174A-9D77-9643FD099CA6}" type="datetime1">
+              <a:rPr lang="en-US" smtClean="0"/>
+              <a:t>2/29/16</a:t>
             </a:fld>
             <a:endParaRPr lang="en-US"/>
           </a:p>
@@ -1816,6 +1930,10 @@
           <a:bodyPr/>
           <a:lstStyle/>
           <a:p>
+            <a:r>
+              <a:rPr lang="en-US" smtClean="0"/>
+              <a:t>Ashim Lamichhane</a:t>
+            </a:r>
             <a:endParaRPr lang="en-US"/>
           </a:p>
         </p:txBody>
@@ -2211,10 +2329,9 @@
           <a:bodyPr/>
           <a:lstStyle/>
           <a:p>
-            <a:fld id="{1D8BD707-D9CF-40AE-B4C6-C98DA3205C09}" type="datetimeFigureOut">
-              <a:rPr lang="en-US" smtClean="0"/>
-              <a:pPr/>
-              <a:t>1/10/2016</a:t>
+            <a:fld id="{99036D1E-CCE9-B845-B9E7-A7136D808943}" type="datetime1">
+              <a:rPr lang="en-US" smtClean="0"/>
+              <a:t>2/29/16</a:t>
             </a:fld>
             <a:endParaRPr lang="en-US"/>
           </a:p>
@@ -2235,6 +2352,10 @@
           <a:bodyPr/>
           <a:lstStyle/>
           <a:p>
+            <a:r>
+              <a:rPr lang="en-US" smtClean="0"/>
+              <a:t>Ashim Lamichhane</a:t>
+            </a:r>
             <a:endParaRPr lang="en-US"/>
           </a:p>
         </p:txBody>
@@ -2326,10 +2447,9 @@
           <a:bodyPr/>
           <a:lstStyle/>
           <a:p>
-            <a:fld id="{1D8BD707-D9CF-40AE-B4C6-C98DA3205C09}" type="datetimeFigureOut">
-              <a:rPr lang="en-US" smtClean="0"/>
-              <a:pPr/>
-              <a:t>1/10/2016</a:t>
+            <a:fld id="{D11E73B3-A245-0E4D-AC9F-B3EFC591061E}" type="datetime1">
+              <a:rPr lang="en-US" smtClean="0"/>
+              <a:t>2/29/16</a:t>
             </a:fld>
             <a:endParaRPr lang="en-US"/>
           </a:p>
@@ -2350,6 +2470,10 @@
           <a:bodyPr/>
           <a:lstStyle/>
           <a:p>
+            <a:r>
+              <a:rPr lang="en-US" smtClean="0"/>
+              <a:t>Ashim Lamichhane</a:t>
+            </a:r>
             <a:endParaRPr lang="en-US"/>
           </a:p>
         </p:txBody>
@@ -2418,10 +2542,9 @@
           <a:bodyPr/>
           <a:lstStyle/>
           <a:p>
-            <a:fld id="{1D8BD707-D9CF-40AE-B4C6-C98DA3205C09}" type="datetimeFigureOut">
-              <a:rPr lang="en-US" smtClean="0"/>
-              <a:pPr/>
-              <a:t>1/10/2016</a:t>
+            <a:fld id="{4D7C8A48-4581-C640-870A-920B999D98D5}" type="datetime1">
+              <a:rPr lang="en-US" smtClean="0"/>
+              <a:t>2/29/16</a:t>
             </a:fld>
             <a:endParaRPr lang="en-US"/>
           </a:p>
@@ -2442,6 +2565,10 @@
           <a:bodyPr/>
           <a:lstStyle/>
           <a:p>
+            <a:r>
+              <a:rPr lang="en-US" smtClean="0"/>
+              <a:t>Ashim Lamichhane</a:t>
+            </a:r>
             <a:endParaRPr lang="en-US"/>
           </a:p>
         </p:txBody>
@@ -2692,10 +2819,9 @@
           <a:bodyPr/>
           <a:lstStyle/>
           <a:p>
-            <a:fld id="{1D8BD707-D9CF-40AE-B4C6-C98DA3205C09}" type="datetimeFigureOut">
-              <a:rPr lang="en-US" smtClean="0"/>
-              <a:pPr/>
-              <a:t>1/10/2016</a:t>
+            <a:fld id="{D80C9DDE-59BC-9843-9C8C-A2668DFC5692}" type="datetime1">
+              <a:rPr lang="en-US" smtClean="0"/>
+              <a:t>2/29/16</a:t>
             </a:fld>
             <a:endParaRPr lang="en-US"/>
           </a:p>
@@ -2716,6 +2842,10 @@
           <a:bodyPr/>
           <a:lstStyle/>
           <a:p>
+            <a:r>
+              <a:rPr lang="en-US" smtClean="0"/>
+              <a:t>Ashim Lamichhane</a:t>
+            </a:r>
             <a:endParaRPr lang="en-US"/>
           </a:p>
         </p:txBody>
@@ -2942,10 +3072,9 @@
           <a:bodyPr/>
           <a:lstStyle/>
           <a:p>
-            <a:fld id="{1D8BD707-D9CF-40AE-B4C6-C98DA3205C09}" type="datetimeFigureOut">
-              <a:rPr lang="en-US" smtClean="0"/>
-              <a:pPr/>
-              <a:t>1/10/2016</a:t>
+            <a:fld id="{E19F9B69-C80B-344F-BA29-36CD47DB5EA3}" type="datetime1">
+              <a:rPr lang="en-US" smtClean="0"/>
+              <a:t>2/29/16</a:t>
             </a:fld>
             <a:endParaRPr lang="en-US"/>
           </a:p>
@@ -2966,6 +3095,10 @@
           <a:bodyPr/>
           <a:lstStyle/>
           <a:p>
+            <a:r>
+              <a:rPr lang="en-US" smtClean="0"/>
+              <a:t>Ashim Lamichhane</a:t>
+            </a:r>
             <a:endParaRPr lang="en-US"/>
           </a:p>
         </p:txBody>
@@ -3152,10 +3285,9 @@
             </a:lvl1pPr>
           </a:lstStyle>
           <a:p>
-            <a:fld id="{1D8BD707-D9CF-40AE-B4C6-C98DA3205C09}" type="datetimeFigureOut">
-              <a:rPr lang="en-US" smtClean="0"/>
-              <a:pPr/>
-              <a:t>1/10/2016</a:t>
+            <a:fld id="{7DC87F54-7478-874F-9F85-57DF2C04B723}" type="datetime1">
+              <a:rPr lang="en-US" smtClean="0"/>
+              <a:t>2/29/16</a:t>
             </a:fld>
             <a:endParaRPr lang="en-US"/>
           </a:p>
@@ -3194,6 +3326,10 @@
             </a:lvl1pPr>
           </a:lstStyle>
           <a:p>
+            <a:r>
+              <a:rPr lang="en-US" smtClean="0"/>
+              <a:t>Ashim Lamichhane</a:t>
+            </a:r>
             <a:endParaRPr lang="en-US"/>
           </a:p>
         </p:txBody>
@@ -3256,6 +3392,7 @@
     <p:sldLayoutId id="2147483658" r:id="rId10"/>
     <p:sldLayoutId id="2147483659" r:id="rId11"/>
   </p:sldLayoutIdLst>
+  <p:hf hdr="0" dt="0"/>
   <p:txStyles>
     <p:titleStyle>
       <a:lvl1pPr algn="ctr" defTabSz="914400" rtl="0" eaLnBrk="1" latinLnBrk="0" hangingPunct="1">
@@ -3688,6 +3825,53 @@
           </a:extLst>
         </p:spPr>
       </p:pic>
+      <p:sp>
+        <p:nvSpPr>
+          <p:cNvPr id="4" name="Footer Placeholder 3"/>
+          <p:cNvSpPr>
+            <a:spLocks noGrp="1"/>
+          </p:cNvSpPr>
+          <p:nvPr>
+            <p:ph type="ftr" sz="quarter" idx="11"/>
+          </p:nvPr>
+        </p:nvSpPr>
+        <p:spPr/>
+        <p:txBody>
+          <a:bodyPr/>
+          <a:lstStyle/>
+          <a:p>
+            <a:r>
+              <a:rPr lang="en-US" smtClean="0"/>
+              <a:t>Ashim Lamichhane</a:t>
+            </a:r>
+            <a:endParaRPr lang="en-US"/>
+          </a:p>
+        </p:txBody>
+      </p:sp>
+      <p:sp>
+        <p:nvSpPr>
+          <p:cNvPr id="5" name="Slide Number Placeholder 4"/>
+          <p:cNvSpPr>
+            <a:spLocks noGrp="1"/>
+          </p:cNvSpPr>
+          <p:nvPr>
+            <p:ph type="sldNum" sz="quarter" idx="12"/>
+          </p:nvPr>
+        </p:nvSpPr>
+        <p:spPr/>
+        <p:txBody>
+          <a:bodyPr/>
+          <a:lstStyle/>
+          <a:p>
+            <a:fld id="{B6F15528-21DE-4FAA-801E-634DDDAF4B2B}" type="slidenum">
+              <a:rPr lang="en-US" smtClean="0"/>
+              <a:pPr/>
+              <a:t>10</a:t>
+            </a:fld>
+            <a:endParaRPr lang="en-US"/>
+          </a:p>
+        </p:txBody>
+      </p:sp>
     </p:spTree>
     <p:extLst>
       <p:ext uri="{BB962C8B-B14F-4D97-AF65-F5344CB8AC3E}">
@@ -3973,6 +4157,53 @@
           </a:p>
         </p:txBody>
       </p:sp>
+      <p:sp>
+        <p:nvSpPr>
+          <p:cNvPr id="2" name="Footer Placeholder 1"/>
+          <p:cNvSpPr>
+            <a:spLocks noGrp="1"/>
+          </p:cNvSpPr>
+          <p:nvPr>
+            <p:ph type="ftr" sz="quarter" idx="11"/>
+          </p:nvPr>
+        </p:nvSpPr>
+        <p:spPr/>
+        <p:txBody>
+          <a:bodyPr/>
+          <a:lstStyle/>
+          <a:p>
+            <a:r>
+              <a:rPr lang="en-US" smtClean="0"/>
+              <a:t>Ashim Lamichhane</a:t>
+            </a:r>
+            <a:endParaRPr lang="en-US"/>
+          </a:p>
+        </p:txBody>
+      </p:sp>
+      <p:sp>
+        <p:nvSpPr>
+          <p:cNvPr id="4" name="Slide Number Placeholder 3"/>
+          <p:cNvSpPr>
+            <a:spLocks noGrp="1"/>
+          </p:cNvSpPr>
+          <p:nvPr>
+            <p:ph type="sldNum" sz="quarter" idx="12"/>
+          </p:nvPr>
+        </p:nvSpPr>
+        <p:spPr/>
+        <p:txBody>
+          <a:bodyPr/>
+          <a:lstStyle/>
+          <a:p>
+            <a:fld id="{B6F15528-21DE-4FAA-801E-634DDDAF4B2B}" type="slidenum">
+              <a:rPr lang="en-US" smtClean="0"/>
+              <a:pPr/>
+              <a:t>11</a:t>
+            </a:fld>
+            <a:endParaRPr lang="en-US"/>
+          </a:p>
+        </p:txBody>
+      </p:sp>
     </p:spTree>
     <p:extLst>
       <p:ext uri="{BB962C8B-B14F-4D97-AF65-F5344CB8AC3E}">
@@ -4178,6 +4409,53 @@
           </a:p>
         </p:txBody>
       </p:sp>
+      <p:sp>
+        <p:nvSpPr>
+          <p:cNvPr id="2" name="Footer Placeholder 1"/>
+          <p:cNvSpPr>
+            <a:spLocks noGrp="1"/>
+          </p:cNvSpPr>
+          <p:nvPr>
+            <p:ph type="ftr" sz="quarter" idx="11"/>
+          </p:nvPr>
+        </p:nvSpPr>
+        <p:spPr/>
+        <p:txBody>
+          <a:bodyPr/>
+          <a:lstStyle/>
+          <a:p>
+            <a:r>
+              <a:rPr lang="en-US" smtClean="0"/>
+              <a:t>Ashim Lamichhane</a:t>
+            </a:r>
+            <a:endParaRPr lang="en-US"/>
+          </a:p>
+        </p:txBody>
+      </p:sp>
+      <p:sp>
+        <p:nvSpPr>
+          <p:cNvPr id="4" name="Slide Number Placeholder 3"/>
+          <p:cNvSpPr>
+            <a:spLocks noGrp="1"/>
+          </p:cNvSpPr>
+          <p:nvPr>
+            <p:ph type="sldNum" sz="quarter" idx="12"/>
+          </p:nvPr>
+        </p:nvSpPr>
+        <p:spPr/>
+        <p:txBody>
+          <a:bodyPr/>
+          <a:lstStyle/>
+          <a:p>
+            <a:fld id="{B6F15528-21DE-4FAA-801E-634DDDAF4B2B}" type="slidenum">
+              <a:rPr lang="en-US" smtClean="0"/>
+              <a:pPr/>
+              <a:t>12</a:t>
+            </a:fld>
+            <a:endParaRPr lang="en-US"/>
+          </a:p>
+        </p:txBody>
+      </p:sp>
     </p:spTree>
     <p:extLst>
       <p:ext uri="{BB962C8B-B14F-4D97-AF65-F5344CB8AC3E}">
@@ -4384,6 +4662,53 @@
           </a:p>
         </p:txBody>
       </p:sp>
+      <p:sp>
+        <p:nvSpPr>
+          <p:cNvPr id="2" name="Footer Placeholder 1"/>
+          <p:cNvSpPr>
+            <a:spLocks noGrp="1"/>
+          </p:cNvSpPr>
+          <p:nvPr>
+            <p:ph type="ftr" sz="quarter" idx="11"/>
+          </p:nvPr>
+        </p:nvSpPr>
+        <p:spPr/>
+        <p:txBody>
+          <a:bodyPr/>
+          <a:lstStyle/>
+          <a:p>
+            <a:r>
+              <a:rPr lang="en-US" smtClean="0"/>
+              <a:t>Ashim Lamichhane</a:t>
+            </a:r>
+            <a:endParaRPr lang="en-US"/>
+          </a:p>
+        </p:txBody>
+      </p:sp>
+      <p:sp>
+        <p:nvSpPr>
+          <p:cNvPr id="4" name="Slide Number Placeholder 3"/>
+          <p:cNvSpPr>
+            <a:spLocks noGrp="1"/>
+          </p:cNvSpPr>
+          <p:nvPr>
+            <p:ph type="sldNum" sz="quarter" idx="12"/>
+          </p:nvPr>
+        </p:nvSpPr>
+        <p:spPr/>
+        <p:txBody>
+          <a:bodyPr/>
+          <a:lstStyle/>
+          <a:p>
+            <a:fld id="{B6F15528-21DE-4FAA-801E-634DDDAF4B2B}" type="slidenum">
+              <a:rPr lang="en-US" smtClean="0"/>
+              <a:pPr/>
+              <a:t>13</a:t>
+            </a:fld>
+            <a:endParaRPr lang="en-US"/>
+          </a:p>
+        </p:txBody>
+      </p:sp>
     </p:spTree>
     <p:extLst>
       <p:ext uri="{BB962C8B-B14F-4D97-AF65-F5344CB8AC3E}">
@@ -4588,6 +4913,53 @@
           </a:p>
         </p:txBody>
       </p:sp>
+      <p:sp>
+        <p:nvSpPr>
+          <p:cNvPr id="2" name="Footer Placeholder 1"/>
+          <p:cNvSpPr>
+            <a:spLocks noGrp="1"/>
+          </p:cNvSpPr>
+          <p:nvPr>
+            <p:ph type="ftr" sz="quarter" idx="11"/>
+          </p:nvPr>
+        </p:nvSpPr>
+        <p:spPr/>
+        <p:txBody>
+          <a:bodyPr/>
+          <a:lstStyle/>
+          <a:p>
+            <a:r>
+              <a:rPr lang="en-US" smtClean="0"/>
+              <a:t>Ashim Lamichhane</a:t>
+            </a:r>
+            <a:endParaRPr lang="en-US"/>
+          </a:p>
+        </p:txBody>
+      </p:sp>
+      <p:sp>
+        <p:nvSpPr>
+          <p:cNvPr id="4" name="Slide Number Placeholder 3"/>
+          <p:cNvSpPr>
+            <a:spLocks noGrp="1"/>
+          </p:cNvSpPr>
+          <p:nvPr>
+            <p:ph type="sldNum" sz="quarter" idx="12"/>
+          </p:nvPr>
+        </p:nvSpPr>
+        <p:spPr/>
+        <p:txBody>
+          <a:bodyPr/>
+          <a:lstStyle/>
+          <a:p>
+            <a:fld id="{B6F15528-21DE-4FAA-801E-634DDDAF4B2B}" type="slidenum">
+              <a:rPr lang="en-US" smtClean="0"/>
+              <a:pPr/>
+              <a:t>14</a:t>
+            </a:fld>
+            <a:endParaRPr lang="en-US"/>
+          </a:p>
+        </p:txBody>
+      </p:sp>
     </p:spTree>
     <p:extLst>
       <p:ext uri="{BB962C8B-B14F-4D97-AF65-F5344CB8AC3E}">
@@ -4778,6 +5150,53 @@
           </a:p>
         </p:txBody>
       </p:sp>
+      <p:sp>
+        <p:nvSpPr>
+          <p:cNvPr id="2" name="Footer Placeholder 1"/>
+          <p:cNvSpPr>
+            <a:spLocks noGrp="1"/>
+          </p:cNvSpPr>
+          <p:nvPr>
+            <p:ph type="ftr" sz="quarter" idx="11"/>
+          </p:nvPr>
+        </p:nvSpPr>
+        <p:spPr/>
+        <p:txBody>
+          <a:bodyPr/>
+          <a:lstStyle/>
+          <a:p>
+            <a:r>
+              <a:rPr lang="en-US" smtClean="0"/>
+              <a:t>Ashim Lamichhane</a:t>
+            </a:r>
+            <a:endParaRPr lang="en-US"/>
+          </a:p>
+        </p:txBody>
+      </p:sp>
+      <p:sp>
+        <p:nvSpPr>
+          <p:cNvPr id="4" name="Slide Number Placeholder 3"/>
+          <p:cNvSpPr>
+            <a:spLocks noGrp="1"/>
+          </p:cNvSpPr>
+          <p:nvPr>
+            <p:ph type="sldNum" sz="quarter" idx="12"/>
+          </p:nvPr>
+        </p:nvSpPr>
+        <p:spPr/>
+        <p:txBody>
+          <a:bodyPr/>
+          <a:lstStyle/>
+          <a:p>
+            <a:fld id="{B6F15528-21DE-4FAA-801E-634DDDAF4B2B}" type="slidenum">
+              <a:rPr lang="en-US" smtClean="0"/>
+              <a:pPr/>
+              <a:t>15</a:t>
+            </a:fld>
+            <a:endParaRPr lang="en-US"/>
+          </a:p>
+        </p:txBody>
+      </p:sp>
     </p:spTree>
     <p:extLst>
       <p:ext uri="{BB962C8B-B14F-4D97-AF65-F5344CB8AC3E}">
@@ -4931,6 +5350,53 @@
           </a:p>
         </p:txBody>
       </p:sp>
+      <p:sp>
+        <p:nvSpPr>
+          <p:cNvPr id="4" name="Footer Placeholder 3"/>
+          <p:cNvSpPr>
+            <a:spLocks noGrp="1"/>
+          </p:cNvSpPr>
+          <p:nvPr>
+            <p:ph type="ftr" sz="quarter" idx="11"/>
+          </p:nvPr>
+        </p:nvSpPr>
+        <p:spPr/>
+        <p:txBody>
+          <a:bodyPr/>
+          <a:lstStyle/>
+          <a:p>
+            <a:r>
+              <a:rPr lang="en-US" smtClean="0"/>
+              <a:t>Ashim Lamichhane</a:t>
+            </a:r>
+            <a:endParaRPr lang="en-US"/>
+          </a:p>
+        </p:txBody>
+      </p:sp>
+      <p:sp>
+        <p:nvSpPr>
+          <p:cNvPr id="5" name="Slide Number Placeholder 4"/>
+          <p:cNvSpPr>
+            <a:spLocks noGrp="1"/>
+          </p:cNvSpPr>
+          <p:nvPr>
+            <p:ph type="sldNum" sz="quarter" idx="12"/>
+          </p:nvPr>
+        </p:nvSpPr>
+        <p:spPr/>
+        <p:txBody>
+          <a:bodyPr/>
+          <a:lstStyle/>
+          <a:p>
+            <a:fld id="{B6F15528-21DE-4FAA-801E-634DDDAF4B2B}" type="slidenum">
+              <a:rPr lang="en-US" smtClean="0"/>
+              <a:pPr/>
+              <a:t>16</a:t>
+            </a:fld>
+            <a:endParaRPr lang="en-US"/>
+          </a:p>
+        </p:txBody>
+      </p:sp>
     </p:spTree>
     <p:extLst>
       <p:ext uri="{BB962C8B-B14F-4D97-AF65-F5344CB8AC3E}">
@@ -5154,6 +5620,53 @@
           </a:p>
         </p:txBody>
       </p:sp>
+      <p:sp>
+        <p:nvSpPr>
+          <p:cNvPr id="4" name="Footer Placeholder 3"/>
+          <p:cNvSpPr>
+            <a:spLocks noGrp="1"/>
+          </p:cNvSpPr>
+          <p:nvPr>
+            <p:ph type="ftr" sz="quarter" idx="11"/>
+          </p:nvPr>
+        </p:nvSpPr>
+        <p:spPr/>
+        <p:txBody>
+          <a:bodyPr/>
+          <a:lstStyle/>
+          <a:p>
+            <a:r>
+              <a:rPr lang="en-US" smtClean="0"/>
+              <a:t>Ashim Lamichhane</a:t>
+            </a:r>
+            <a:endParaRPr lang="en-US"/>
+          </a:p>
+        </p:txBody>
+      </p:sp>
+      <p:sp>
+        <p:nvSpPr>
+          <p:cNvPr id="5" name="Slide Number Placeholder 4"/>
+          <p:cNvSpPr>
+            <a:spLocks noGrp="1"/>
+          </p:cNvSpPr>
+          <p:nvPr>
+            <p:ph type="sldNum" sz="quarter" idx="12"/>
+          </p:nvPr>
+        </p:nvSpPr>
+        <p:spPr/>
+        <p:txBody>
+          <a:bodyPr/>
+          <a:lstStyle/>
+          <a:p>
+            <a:fld id="{B6F15528-21DE-4FAA-801E-634DDDAF4B2B}" type="slidenum">
+              <a:rPr lang="en-US" smtClean="0"/>
+              <a:pPr/>
+              <a:t>17</a:t>
+            </a:fld>
+            <a:endParaRPr lang="en-US"/>
+          </a:p>
+        </p:txBody>
+      </p:sp>
     </p:spTree>
     <p:extLst>
       <p:ext uri="{BB962C8B-B14F-4D97-AF65-F5344CB8AC3E}">
@@ -5359,6 +5872,53 @@
           </a:p>
         </p:txBody>
       </p:sp>
+      <p:sp>
+        <p:nvSpPr>
+          <p:cNvPr id="2" name="Footer Placeholder 1"/>
+          <p:cNvSpPr>
+            <a:spLocks noGrp="1"/>
+          </p:cNvSpPr>
+          <p:nvPr>
+            <p:ph type="ftr" sz="quarter" idx="11"/>
+          </p:nvPr>
+        </p:nvSpPr>
+        <p:spPr/>
+        <p:txBody>
+          <a:bodyPr/>
+          <a:lstStyle/>
+          <a:p>
+            <a:r>
+              <a:rPr lang="en-US" smtClean="0"/>
+              <a:t>Ashim Lamichhane</a:t>
+            </a:r>
+            <a:endParaRPr lang="en-US"/>
+          </a:p>
+        </p:txBody>
+      </p:sp>
+      <p:sp>
+        <p:nvSpPr>
+          <p:cNvPr id="4" name="Slide Number Placeholder 3"/>
+          <p:cNvSpPr>
+            <a:spLocks noGrp="1"/>
+          </p:cNvSpPr>
+          <p:nvPr>
+            <p:ph type="sldNum" sz="quarter" idx="12"/>
+          </p:nvPr>
+        </p:nvSpPr>
+        <p:spPr/>
+        <p:txBody>
+          <a:bodyPr/>
+          <a:lstStyle/>
+          <a:p>
+            <a:fld id="{B6F15528-21DE-4FAA-801E-634DDDAF4B2B}" type="slidenum">
+              <a:rPr lang="en-US" smtClean="0"/>
+              <a:pPr/>
+              <a:t>18</a:t>
+            </a:fld>
+            <a:endParaRPr lang="en-US"/>
+          </a:p>
+        </p:txBody>
+      </p:sp>
     </p:spTree>
     <p:extLst>
       <p:ext uri="{BB962C8B-B14F-4D97-AF65-F5344CB8AC3E}">
@@ -5540,6 +6100,53 @@
           </a:p>
         </p:txBody>
       </p:sp>
+      <p:sp>
+        <p:nvSpPr>
+          <p:cNvPr id="4" name="Footer Placeholder 3"/>
+          <p:cNvSpPr>
+            <a:spLocks noGrp="1"/>
+          </p:cNvSpPr>
+          <p:nvPr>
+            <p:ph type="ftr" sz="quarter" idx="11"/>
+          </p:nvPr>
+        </p:nvSpPr>
+        <p:spPr/>
+        <p:txBody>
+          <a:bodyPr/>
+          <a:lstStyle/>
+          <a:p>
+            <a:r>
+              <a:rPr lang="en-US" smtClean="0"/>
+              <a:t>Ashim Lamichhane</a:t>
+            </a:r>
+            <a:endParaRPr lang="en-US"/>
+          </a:p>
+        </p:txBody>
+      </p:sp>
+      <p:sp>
+        <p:nvSpPr>
+          <p:cNvPr id="5" name="Slide Number Placeholder 4"/>
+          <p:cNvSpPr>
+            <a:spLocks noGrp="1"/>
+          </p:cNvSpPr>
+          <p:nvPr>
+            <p:ph type="sldNum" sz="quarter" idx="12"/>
+          </p:nvPr>
+        </p:nvSpPr>
+        <p:spPr/>
+        <p:txBody>
+          <a:bodyPr/>
+          <a:lstStyle/>
+          <a:p>
+            <a:fld id="{B6F15528-21DE-4FAA-801E-634DDDAF4B2B}" type="slidenum">
+              <a:rPr lang="en-US" smtClean="0"/>
+              <a:pPr/>
+              <a:t>19</a:t>
+            </a:fld>
+            <a:endParaRPr lang="en-US"/>
+          </a:p>
+        </p:txBody>
+      </p:sp>
     </p:spTree>
     <p:extLst>
       <p:ext uri="{BB962C8B-B14F-4D97-AF65-F5344CB8AC3E}">
@@ -5679,6 +6286,53 @@
           </a:p>
         </p:txBody>
       </p:sp>
+      <p:sp>
+        <p:nvSpPr>
+          <p:cNvPr id="4" name="Footer Placeholder 3"/>
+          <p:cNvSpPr>
+            <a:spLocks noGrp="1"/>
+          </p:cNvSpPr>
+          <p:nvPr>
+            <p:ph type="ftr" sz="quarter" idx="11"/>
+          </p:nvPr>
+        </p:nvSpPr>
+        <p:spPr/>
+        <p:txBody>
+          <a:bodyPr/>
+          <a:lstStyle/>
+          <a:p>
+            <a:r>
+              <a:rPr lang="en-US" smtClean="0"/>
+              <a:t>Ashim Lamichhane</a:t>
+            </a:r>
+            <a:endParaRPr lang="en-US"/>
+          </a:p>
+        </p:txBody>
+      </p:sp>
+      <p:sp>
+        <p:nvSpPr>
+          <p:cNvPr id="5" name="Slide Number Placeholder 4"/>
+          <p:cNvSpPr>
+            <a:spLocks noGrp="1"/>
+          </p:cNvSpPr>
+          <p:nvPr>
+            <p:ph type="sldNum" sz="quarter" idx="12"/>
+          </p:nvPr>
+        </p:nvSpPr>
+        <p:spPr/>
+        <p:txBody>
+          <a:bodyPr/>
+          <a:lstStyle/>
+          <a:p>
+            <a:fld id="{B6F15528-21DE-4FAA-801E-634DDDAF4B2B}" type="slidenum">
+              <a:rPr lang="en-US" smtClean="0"/>
+              <a:pPr/>
+              <a:t>2</a:t>
+            </a:fld>
+            <a:endParaRPr lang="en-US"/>
+          </a:p>
+        </p:txBody>
+      </p:sp>
     </p:spTree>
     <p:extLst>
       <p:ext uri="{BB962C8B-B14F-4D97-AF65-F5344CB8AC3E}">
@@ -5875,6 +6529,53 @@
           </a:p>
         </p:txBody>
       </p:sp>
+      <p:sp>
+        <p:nvSpPr>
+          <p:cNvPr id="4" name="Footer Placeholder 3"/>
+          <p:cNvSpPr>
+            <a:spLocks noGrp="1"/>
+          </p:cNvSpPr>
+          <p:nvPr>
+            <p:ph type="ftr" sz="quarter" idx="11"/>
+          </p:nvPr>
+        </p:nvSpPr>
+        <p:spPr/>
+        <p:txBody>
+          <a:bodyPr/>
+          <a:lstStyle/>
+          <a:p>
+            <a:r>
+              <a:rPr lang="en-US" smtClean="0"/>
+              <a:t>Ashim Lamichhane</a:t>
+            </a:r>
+            <a:endParaRPr lang="en-US"/>
+          </a:p>
+        </p:txBody>
+      </p:sp>
+      <p:sp>
+        <p:nvSpPr>
+          <p:cNvPr id="5" name="Slide Number Placeholder 4"/>
+          <p:cNvSpPr>
+            <a:spLocks noGrp="1"/>
+          </p:cNvSpPr>
+          <p:nvPr>
+            <p:ph type="sldNum" sz="quarter" idx="12"/>
+          </p:nvPr>
+        </p:nvSpPr>
+        <p:spPr/>
+        <p:txBody>
+          <a:bodyPr/>
+          <a:lstStyle/>
+          <a:p>
+            <a:fld id="{B6F15528-21DE-4FAA-801E-634DDDAF4B2B}" type="slidenum">
+              <a:rPr lang="en-US" smtClean="0"/>
+              <a:pPr/>
+              <a:t>20</a:t>
+            </a:fld>
+            <a:endParaRPr lang="en-US"/>
+          </a:p>
+        </p:txBody>
+      </p:sp>
     </p:spTree>
     <p:extLst>
       <p:ext uri="{BB962C8B-B14F-4D97-AF65-F5344CB8AC3E}">
@@ -6023,6 +6724,53 @@
           </a:p>
         </p:txBody>
       </p:sp>
+      <p:sp>
+        <p:nvSpPr>
+          <p:cNvPr id="2" name="Footer Placeholder 1"/>
+          <p:cNvSpPr>
+            <a:spLocks noGrp="1"/>
+          </p:cNvSpPr>
+          <p:nvPr>
+            <p:ph type="ftr" sz="quarter" idx="11"/>
+          </p:nvPr>
+        </p:nvSpPr>
+        <p:spPr/>
+        <p:txBody>
+          <a:bodyPr/>
+          <a:lstStyle/>
+          <a:p>
+            <a:r>
+              <a:rPr lang="en-US" smtClean="0"/>
+              <a:t>Ashim Lamichhane</a:t>
+            </a:r>
+            <a:endParaRPr lang="en-US"/>
+          </a:p>
+        </p:txBody>
+      </p:sp>
+      <p:sp>
+        <p:nvSpPr>
+          <p:cNvPr id="4" name="Slide Number Placeholder 3"/>
+          <p:cNvSpPr>
+            <a:spLocks noGrp="1"/>
+          </p:cNvSpPr>
+          <p:nvPr>
+            <p:ph type="sldNum" sz="quarter" idx="12"/>
+          </p:nvPr>
+        </p:nvSpPr>
+        <p:spPr/>
+        <p:txBody>
+          <a:bodyPr/>
+          <a:lstStyle/>
+          <a:p>
+            <a:fld id="{B6F15528-21DE-4FAA-801E-634DDDAF4B2B}" type="slidenum">
+              <a:rPr lang="en-US" smtClean="0"/>
+              <a:pPr/>
+              <a:t>21</a:t>
+            </a:fld>
+            <a:endParaRPr lang="en-US"/>
+          </a:p>
+        </p:txBody>
+      </p:sp>
     </p:spTree>
     <p:extLst>
       <p:ext uri="{BB962C8B-B14F-4D97-AF65-F5344CB8AC3E}">
@@ -6234,6 +6982,53 @@
           </a:p>
         </p:txBody>
       </p:sp>
+      <p:sp>
+        <p:nvSpPr>
+          <p:cNvPr id="4" name="Footer Placeholder 3"/>
+          <p:cNvSpPr>
+            <a:spLocks noGrp="1"/>
+          </p:cNvSpPr>
+          <p:nvPr>
+            <p:ph type="ftr" sz="quarter" idx="11"/>
+          </p:nvPr>
+        </p:nvSpPr>
+        <p:spPr/>
+        <p:txBody>
+          <a:bodyPr/>
+          <a:lstStyle/>
+          <a:p>
+            <a:r>
+              <a:rPr lang="en-US" smtClean="0"/>
+              <a:t>Ashim Lamichhane</a:t>
+            </a:r>
+            <a:endParaRPr lang="en-US"/>
+          </a:p>
+        </p:txBody>
+      </p:sp>
+      <p:sp>
+        <p:nvSpPr>
+          <p:cNvPr id="5" name="Slide Number Placeholder 4"/>
+          <p:cNvSpPr>
+            <a:spLocks noGrp="1"/>
+          </p:cNvSpPr>
+          <p:nvPr>
+            <p:ph type="sldNum" sz="quarter" idx="12"/>
+          </p:nvPr>
+        </p:nvSpPr>
+        <p:spPr/>
+        <p:txBody>
+          <a:bodyPr/>
+          <a:lstStyle/>
+          <a:p>
+            <a:fld id="{B6F15528-21DE-4FAA-801E-634DDDAF4B2B}" type="slidenum">
+              <a:rPr lang="en-US" smtClean="0"/>
+              <a:pPr/>
+              <a:t>22</a:t>
+            </a:fld>
+            <a:endParaRPr lang="en-US"/>
+          </a:p>
+        </p:txBody>
+      </p:sp>
     </p:spTree>
     <p:extLst>
       <p:ext uri="{BB962C8B-B14F-4D97-AF65-F5344CB8AC3E}">
@@ -6396,6 +7191,53 @@
           </a:p>
         </p:txBody>
       </p:sp>
+      <p:sp>
+        <p:nvSpPr>
+          <p:cNvPr id="2" name="Footer Placeholder 1"/>
+          <p:cNvSpPr>
+            <a:spLocks noGrp="1"/>
+          </p:cNvSpPr>
+          <p:nvPr>
+            <p:ph type="ftr" sz="quarter" idx="11"/>
+          </p:nvPr>
+        </p:nvSpPr>
+        <p:spPr/>
+        <p:txBody>
+          <a:bodyPr/>
+          <a:lstStyle/>
+          <a:p>
+            <a:r>
+              <a:rPr lang="en-US" smtClean="0"/>
+              <a:t>Ashim Lamichhane</a:t>
+            </a:r>
+            <a:endParaRPr lang="en-US"/>
+          </a:p>
+        </p:txBody>
+      </p:sp>
+      <p:sp>
+        <p:nvSpPr>
+          <p:cNvPr id="4" name="Slide Number Placeholder 3"/>
+          <p:cNvSpPr>
+            <a:spLocks noGrp="1"/>
+          </p:cNvSpPr>
+          <p:nvPr>
+            <p:ph type="sldNum" sz="quarter" idx="12"/>
+          </p:nvPr>
+        </p:nvSpPr>
+        <p:spPr/>
+        <p:txBody>
+          <a:bodyPr/>
+          <a:lstStyle/>
+          <a:p>
+            <a:fld id="{B6F15528-21DE-4FAA-801E-634DDDAF4B2B}" type="slidenum">
+              <a:rPr lang="en-US" smtClean="0"/>
+              <a:pPr/>
+              <a:t>23</a:t>
+            </a:fld>
+            <a:endParaRPr lang="en-US"/>
+          </a:p>
+        </p:txBody>
+      </p:sp>
     </p:spTree>
     <p:extLst>
       <p:ext uri="{BB962C8B-B14F-4D97-AF65-F5344CB8AC3E}">
@@ -6533,6 +7375,53 @@
           </a:p>
         </p:txBody>
       </p:sp>
+      <p:sp>
+        <p:nvSpPr>
+          <p:cNvPr id="2" name="Footer Placeholder 1"/>
+          <p:cNvSpPr>
+            <a:spLocks noGrp="1"/>
+          </p:cNvSpPr>
+          <p:nvPr>
+            <p:ph type="ftr" sz="quarter" idx="11"/>
+          </p:nvPr>
+        </p:nvSpPr>
+        <p:spPr/>
+        <p:txBody>
+          <a:bodyPr/>
+          <a:lstStyle/>
+          <a:p>
+            <a:r>
+              <a:rPr lang="en-US" smtClean="0"/>
+              <a:t>Ashim Lamichhane</a:t>
+            </a:r>
+            <a:endParaRPr lang="en-US"/>
+          </a:p>
+        </p:txBody>
+      </p:sp>
+      <p:sp>
+        <p:nvSpPr>
+          <p:cNvPr id="4" name="Slide Number Placeholder 3"/>
+          <p:cNvSpPr>
+            <a:spLocks noGrp="1"/>
+          </p:cNvSpPr>
+          <p:nvPr>
+            <p:ph type="sldNum" sz="quarter" idx="12"/>
+          </p:nvPr>
+        </p:nvSpPr>
+        <p:spPr/>
+        <p:txBody>
+          <a:bodyPr/>
+          <a:lstStyle/>
+          <a:p>
+            <a:fld id="{B6F15528-21DE-4FAA-801E-634DDDAF4B2B}" type="slidenum">
+              <a:rPr lang="en-US" smtClean="0"/>
+              <a:pPr/>
+              <a:t>24</a:t>
+            </a:fld>
+            <a:endParaRPr lang="en-US"/>
+          </a:p>
+        </p:txBody>
+      </p:sp>
     </p:spTree>
     <p:extLst>
       <p:ext uri="{BB962C8B-B14F-4D97-AF65-F5344CB8AC3E}">
@@ -6714,6 +7603,53 @@
           </a:p>
         </p:txBody>
       </p:sp>
+      <p:sp>
+        <p:nvSpPr>
+          <p:cNvPr id="2" name="Footer Placeholder 1"/>
+          <p:cNvSpPr>
+            <a:spLocks noGrp="1"/>
+          </p:cNvSpPr>
+          <p:nvPr>
+            <p:ph type="ftr" sz="quarter" idx="11"/>
+          </p:nvPr>
+        </p:nvSpPr>
+        <p:spPr/>
+        <p:txBody>
+          <a:bodyPr/>
+          <a:lstStyle/>
+          <a:p>
+            <a:r>
+              <a:rPr lang="en-US" smtClean="0"/>
+              <a:t>Ashim Lamichhane</a:t>
+            </a:r>
+            <a:endParaRPr lang="en-US"/>
+          </a:p>
+        </p:txBody>
+      </p:sp>
+      <p:sp>
+        <p:nvSpPr>
+          <p:cNvPr id="4" name="Slide Number Placeholder 3"/>
+          <p:cNvSpPr>
+            <a:spLocks noGrp="1"/>
+          </p:cNvSpPr>
+          <p:nvPr>
+            <p:ph type="sldNum" sz="quarter" idx="12"/>
+          </p:nvPr>
+        </p:nvSpPr>
+        <p:spPr/>
+        <p:txBody>
+          <a:bodyPr/>
+          <a:lstStyle/>
+          <a:p>
+            <a:fld id="{B6F15528-21DE-4FAA-801E-634DDDAF4B2B}" type="slidenum">
+              <a:rPr lang="en-US" smtClean="0"/>
+              <a:pPr/>
+              <a:t>25</a:t>
+            </a:fld>
+            <a:endParaRPr lang="en-US"/>
+          </a:p>
+        </p:txBody>
+      </p:sp>
     </p:spTree>
     <p:extLst>
       <p:ext uri="{BB962C8B-B14F-4D97-AF65-F5344CB8AC3E}">
@@ -6893,6 +7829,53 @@
           </a:p>
         </p:txBody>
       </p:sp>
+      <p:sp>
+        <p:nvSpPr>
+          <p:cNvPr id="2" name="Footer Placeholder 1"/>
+          <p:cNvSpPr>
+            <a:spLocks noGrp="1"/>
+          </p:cNvSpPr>
+          <p:nvPr>
+            <p:ph type="ftr" sz="quarter" idx="11"/>
+          </p:nvPr>
+        </p:nvSpPr>
+        <p:spPr/>
+        <p:txBody>
+          <a:bodyPr/>
+          <a:lstStyle/>
+          <a:p>
+            <a:r>
+              <a:rPr lang="en-US" smtClean="0"/>
+              <a:t>Ashim Lamichhane</a:t>
+            </a:r>
+            <a:endParaRPr lang="en-US"/>
+          </a:p>
+        </p:txBody>
+      </p:sp>
+      <p:sp>
+        <p:nvSpPr>
+          <p:cNvPr id="4" name="Slide Number Placeholder 3"/>
+          <p:cNvSpPr>
+            <a:spLocks noGrp="1"/>
+          </p:cNvSpPr>
+          <p:nvPr>
+            <p:ph type="sldNum" sz="quarter" idx="12"/>
+          </p:nvPr>
+        </p:nvSpPr>
+        <p:spPr/>
+        <p:txBody>
+          <a:bodyPr/>
+          <a:lstStyle/>
+          <a:p>
+            <a:fld id="{B6F15528-21DE-4FAA-801E-634DDDAF4B2B}" type="slidenum">
+              <a:rPr lang="en-US" smtClean="0"/>
+              <a:pPr/>
+              <a:t>26</a:t>
+            </a:fld>
+            <a:endParaRPr lang="en-US"/>
+          </a:p>
+        </p:txBody>
+      </p:sp>
     </p:spTree>
     <p:extLst>
       <p:ext uri="{BB962C8B-B14F-4D97-AF65-F5344CB8AC3E}">
@@ -7047,6 +8030,53 @@
           </a:p>
         </p:txBody>
       </p:sp>
+      <p:sp>
+        <p:nvSpPr>
+          <p:cNvPr id="2" name="Footer Placeholder 1"/>
+          <p:cNvSpPr>
+            <a:spLocks noGrp="1"/>
+          </p:cNvSpPr>
+          <p:nvPr>
+            <p:ph type="ftr" sz="quarter" idx="11"/>
+          </p:nvPr>
+        </p:nvSpPr>
+        <p:spPr/>
+        <p:txBody>
+          <a:bodyPr/>
+          <a:lstStyle/>
+          <a:p>
+            <a:r>
+              <a:rPr lang="en-US" smtClean="0"/>
+              <a:t>Ashim Lamichhane</a:t>
+            </a:r>
+            <a:endParaRPr lang="en-US"/>
+          </a:p>
+        </p:txBody>
+      </p:sp>
+      <p:sp>
+        <p:nvSpPr>
+          <p:cNvPr id="4" name="Slide Number Placeholder 3"/>
+          <p:cNvSpPr>
+            <a:spLocks noGrp="1"/>
+          </p:cNvSpPr>
+          <p:nvPr>
+            <p:ph type="sldNum" sz="quarter" idx="12"/>
+          </p:nvPr>
+        </p:nvSpPr>
+        <p:spPr/>
+        <p:txBody>
+          <a:bodyPr/>
+          <a:lstStyle/>
+          <a:p>
+            <a:fld id="{B6F15528-21DE-4FAA-801E-634DDDAF4B2B}" type="slidenum">
+              <a:rPr lang="en-US" smtClean="0"/>
+              <a:pPr/>
+              <a:t>27</a:t>
+            </a:fld>
+            <a:endParaRPr lang="en-US"/>
+          </a:p>
+        </p:txBody>
+      </p:sp>
     </p:spTree>
     <p:extLst>
       <p:ext uri="{BB962C8B-B14F-4D97-AF65-F5344CB8AC3E}">
@@ -7264,6 +8294,53 @@
           </a:p>
         </p:txBody>
       </p:sp>
+      <p:sp>
+        <p:nvSpPr>
+          <p:cNvPr id="2" name="Footer Placeholder 1"/>
+          <p:cNvSpPr>
+            <a:spLocks noGrp="1"/>
+          </p:cNvSpPr>
+          <p:nvPr>
+            <p:ph type="ftr" sz="quarter" idx="11"/>
+          </p:nvPr>
+        </p:nvSpPr>
+        <p:spPr/>
+        <p:txBody>
+          <a:bodyPr/>
+          <a:lstStyle/>
+          <a:p>
+            <a:r>
+              <a:rPr lang="en-US" smtClean="0"/>
+              <a:t>Ashim Lamichhane</a:t>
+            </a:r>
+            <a:endParaRPr lang="en-US"/>
+          </a:p>
+        </p:txBody>
+      </p:sp>
+      <p:sp>
+        <p:nvSpPr>
+          <p:cNvPr id="4" name="Slide Number Placeholder 3"/>
+          <p:cNvSpPr>
+            <a:spLocks noGrp="1"/>
+          </p:cNvSpPr>
+          <p:nvPr>
+            <p:ph type="sldNum" sz="quarter" idx="12"/>
+          </p:nvPr>
+        </p:nvSpPr>
+        <p:spPr/>
+        <p:txBody>
+          <a:bodyPr/>
+          <a:lstStyle/>
+          <a:p>
+            <a:fld id="{B6F15528-21DE-4FAA-801E-634DDDAF4B2B}" type="slidenum">
+              <a:rPr lang="en-US" smtClean="0"/>
+              <a:pPr/>
+              <a:t>28</a:t>
+            </a:fld>
+            <a:endParaRPr lang="en-US"/>
+          </a:p>
+        </p:txBody>
+      </p:sp>
     </p:spTree>
     <p:extLst>
       <p:ext uri="{BB962C8B-B14F-4D97-AF65-F5344CB8AC3E}">
@@ -7433,6 +8510,53 @@
           </a:p>
         </p:txBody>
       </p:sp>
+      <p:sp>
+        <p:nvSpPr>
+          <p:cNvPr id="2" name="Footer Placeholder 1"/>
+          <p:cNvSpPr>
+            <a:spLocks noGrp="1"/>
+          </p:cNvSpPr>
+          <p:nvPr>
+            <p:ph type="ftr" sz="quarter" idx="11"/>
+          </p:nvPr>
+        </p:nvSpPr>
+        <p:spPr/>
+        <p:txBody>
+          <a:bodyPr/>
+          <a:lstStyle/>
+          <a:p>
+            <a:r>
+              <a:rPr lang="en-US" smtClean="0"/>
+              <a:t>Ashim Lamichhane</a:t>
+            </a:r>
+            <a:endParaRPr lang="en-US"/>
+          </a:p>
+        </p:txBody>
+      </p:sp>
+      <p:sp>
+        <p:nvSpPr>
+          <p:cNvPr id="4" name="Slide Number Placeholder 3"/>
+          <p:cNvSpPr>
+            <a:spLocks noGrp="1"/>
+          </p:cNvSpPr>
+          <p:nvPr>
+            <p:ph type="sldNum" sz="quarter" idx="12"/>
+          </p:nvPr>
+        </p:nvSpPr>
+        <p:spPr/>
+        <p:txBody>
+          <a:bodyPr/>
+          <a:lstStyle/>
+          <a:p>
+            <a:fld id="{B6F15528-21DE-4FAA-801E-634DDDAF4B2B}" type="slidenum">
+              <a:rPr lang="en-US" smtClean="0"/>
+              <a:pPr/>
+              <a:t>29</a:t>
+            </a:fld>
+            <a:endParaRPr lang="en-US"/>
+          </a:p>
+        </p:txBody>
+      </p:sp>
     </p:spTree>
     <p:extLst>
       <p:ext uri="{BB962C8B-B14F-4D97-AF65-F5344CB8AC3E}">
@@ -7595,6 +8719,53 @@
           </a:p>
         </p:txBody>
       </p:sp>
+      <p:sp>
+        <p:nvSpPr>
+          <p:cNvPr id="2" name="Footer Placeholder 1"/>
+          <p:cNvSpPr>
+            <a:spLocks noGrp="1"/>
+          </p:cNvSpPr>
+          <p:nvPr>
+            <p:ph type="ftr" sz="quarter" idx="11"/>
+          </p:nvPr>
+        </p:nvSpPr>
+        <p:spPr/>
+        <p:txBody>
+          <a:bodyPr/>
+          <a:lstStyle/>
+          <a:p>
+            <a:r>
+              <a:rPr lang="en-US" smtClean="0"/>
+              <a:t>Ashim Lamichhane</a:t>
+            </a:r>
+            <a:endParaRPr lang="en-US"/>
+          </a:p>
+        </p:txBody>
+      </p:sp>
+      <p:sp>
+        <p:nvSpPr>
+          <p:cNvPr id="4" name="Slide Number Placeholder 3"/>
+          <p:cNvSpPr>
+            <a:spLocks noGrp="1"/>
+          </p:cNvSpPr>
+          <p:nvPr>
+            <p:ph type="sldNum" sz="quarter" idx="12"/>
+          </p:nvPr>
+        </p:nvSpPr>
+        <p:spPr/>
+        <p:txBody>
+          <a:bodyPr/>
+          <a:lstStyle/>
+          <a:p>
+            <a:fld id="{B6F15528-21DE-4FAA-801E-634DDDAF4B2B}" type="slidenum">
+              <a:rPr lang="en-US" smtClean="0"/>
+              <a:pPr/>
+              <a:t>3</a:t>
+            </a:fld>
+            <a:endParaRPr lang="en-US"/>
+          </a:p>
+        </p:txBody>
+      </p:sp>
     </p:spTree>
     <p:extLst>
       <p:ext uri="{BB962C8B-B14F-4D97-AF65-F5344CB8AC3E}">
@@ -7749,6 +8920,53 @@
           </a:p>
         </p:txBody>
       </p:sp>
+      <p:sp>
+        <p:nvSpPr>
+          <p:cNvPr id="2" name="Footer Placeholder 1"/>
+          <p:cNvSpPr>
+            <a:spLocks noGrp="1"/>
+          </p:cNvSpPr>
+          <p:nvPr>
+            <p:ph type="ftr" sz="quarter" idx="11"/>
+          </p:nvPr>
+        </p:nvSpPr>
+        <p:spPr/>
+        <p:txBody>
+          <a:bodyPr/>
+          <a:lstStyle/>
+          <a:p>
+            <a:r>
+              <a:rPr lang="en-US" smtClean="0"/>
+              <a:t>Ashim Lamichhane</a:t>
+            </a:r>
+            <a:endParaRPr lang="en-US"/>
+          </a:p>
+        </p:txBody>
+      </p:sp>
+      <p:sp>
+        <p:nvSpPr>
+          <p:cNvPr id="4" name="Slide Number Placeholder 3"/>
+          <p:cNvSpPr>
+            <a:spLocks noGrp="1"/>
+          </p:cNvSpPr>
+          <p:nvPr>
+            <p:ph type="sldNum" sz="quarter" idx="12"/>
+          </p:nvPr>
+        </p:nvSpPr>
+        <p:spPr/>
+        <p:txBody>
+          <a:bodyPr/>
+          <a:lstStyle/>
+          <a:p>
+            <a:fld id="{B6F15528-21DE-4FAA-801E-634DDDAF4B2B}" type="slidenum">
+              <a:rPr lang="en-US" smtClean="0"/>
+              <a:pPr/>
+              <a:t>30</a:t>
+            </a:fld>
+            <a:endParaRPr lang="en-US"/>
+          </a:p>
+        </p:txBody>
+      </p:sp>
     </p:spTree>
     <p:extLst>
       <p:ext uri="{BB962C8B-B14F-4D97-AF65-F5344CB8AC3E}">
@@ -7833,6 +9051,53 @@
           </a:p>
         </p:txBody>
       </p:sp>
+      <p:sp>
+        <p:nvSpPr>
+          <p:cNvPr id="4" name="Footer Placeholder 3"/>
+          <p:cNvSpPr>
+            <a:spLocks noGrp="1"/>
+          </p:cNvSpPr>
+          <p:nvPr>
+            <p:ph type="ftr" sz="quarter" idx="11"/>
+          </p:nvPr>
+        </p:nvSpPr>
+        <p:spPr/>
+        <p:txBody>
+          <a:bodyPr/>
+          <a:lstStyle/>
+          <a:p>
+            <a:r>
+              <a:rPr lang="en-US" smtClean="0"/>
+              <a:t>Ashim Lamichhane</a:t>
+            </a:r>
+            <a:endParaRPr lang="en-US"/>
+          </a:p>
+        </p:txBody>
+      </p:sp>
+      <p:sp>
+        <p:nvSpPr>
+          <p:cNvPr id="5" name="Slide Number Placeholder 4"/>
+          <p:cNvSpPr>
+            <a:spLocks noGrp="1"/>
+          </p:cNvSpPr>
+          <p:nvPr>
+            <p:ph type="sldNum" sz="quarter" idx="12"/>
+          </p:nvPr>
+        </p:nvSpPr>
+        <p:spPr/>
+        <p:txBody>
+          <a:bodyPr/>
+          <a:lstStyle/>
+          <a:p>
+            <a:fld id="{B6F15528-21DE-4FAA-801E-634DDDAF4B2B}" type="slidenum">
+              <a:rPr lang="en-US" smtClean="0"/>
+              <a:pPr/>
+              <a:t>31</a:t>
+            </a:fld>
+            <a:endParaRPr lang="en-US"/>
+          </a:p>
+        </p:txBody>
+      </p:sp>
     </p:spTree>
     <p:extLst>
       <p:ext uri="{BB962C8B-B14F-4D97-AF65-F5344CB8AC3E}">
@@ -7981,6 +9246,53 @@
           </a:p>
         </p:txBody>
       </p:sp>
+      <p:sp>
+        <p:nvSpPr>
+          <p:cNvPr id="2" name="Footer Placeholder 1"/>
+          <p:cNvSpPr>
+            <a:spLocks noGrp="1"/>
+          </p:cNvSpPr>
+          <p:nvPr>
+            <p:ph type="ftr" sz="quarter" idx="11"/>
+          </p:nvPr>
+        </p:nvSpPr>
+        <p:spPr/>
+        <p:txBody>
+          <a:bodyPr/>
+          <a:lstStyle/>
+          <a:p>
+            <a:r>
+              <a:rPr lang="en-US" smtClean="0"/>
+              <a:t>Ashim Lamichhane</a:t>
+            </a:r>
+            <a:endParaRPr lang="en-US"/>
+          </a:p>
+        </p:txBody>
+      </p:sp>
+      <p:sp>
+        <p:nvSpPr>
+          <p:cNvPr id="4" name="Slide Number Placeholder 3"/>
+          <p:cNvSpPr>
+            <a:spLocks noGrp="1"/>
+          </p:cNvSpPr>
+          <p:nvPr>
+            <p:ph type="sldNum" sz="quarter" idx="12"/>
+          </p:nvPr>
+        </p:nvSpPr>
+        <p:spPr/>
+        <p:txBody>
+          <a:bodyPr/>
+          <a:lstStyle/>
+          <a:p>
+            <a:fld id="{B6F15528-21DE-4FAA-801E-634DDDAF4B2B}" type="slidenum">
+              <a:rPr lang="en-US" smtClean="0"/>
+              <a:pPr/>
+              <a:t>4</a:t>
+            </a:fld>
+            <a:endParaRPr lang="en-US"/>
+          </a:p>
+        </p:txBody>
+      </p:sp>
     </p:spTree>
     <p:extLst>
       <p:ext uri="{BB962C8B-B14F-4D97-AF65-F5344CB8AC3E}">
@@ -8085,6 +9397,53 @@
           </a:p>
         </p:txBody>
       </p:sp>
+      <p:sp>
+        <p:nvSpPr>
+          <p:cNvPr id="4" name="Footer Placeholder 3"/>
+          <p:cNvSpPr>
+            <a:spLocks noGrp="1"/>
+          </p:cNvSpPr>
+          <p:nvPr>
+            <p:ph type="ftr" sz="quarter" idx="11"/>
+          </p:nvPr>
+        </p:nvSpPr>
+        <p:spPr/>
+        <p:txBody>
+          <a:bodyPr/>
+          <a:lstStyle/>
+          <a:p>
+            <a:r>
+              <a:rPr lang="en-US" smtClean="0"/>
+              <a:t>Ashim Lamichhane</a:t>
+            </a:r>
+            <a:endParaRPr lang="en-US"/>
+          </a:p>
+        </p:txBody>
+      </p:sp>
+      <p:sp>
+        <p:nvSpPr>
+          <p:cNvPr id="5" name="Slide Number Placeholder 4"/>
+          <p:cNvSpPr>
+            <a:spLocks noGrp="1"/>
+          </p:cNvSpPr>
+          <p:nvPr>
+            <p:ph type="sldNum" sz="quarter" idx="12"/>
+          </p:nvPr>
+        </p:nvSpPr>
+        <p:spPr/>
+        <p:txBody>
+          <a:bodyPr/>
+          <a:lstStyle/>
+          <a:p>
+            <a:fld id="{B6F15528-21DE-4FAA-801E-634DDDAF4B2B}" type="slidenum">
+              <a:rPr lang="en-US" smtClean="0"/>
+              <a:pPr/>
+              <a:t>5</a:t>
+            </a:fld>
+            <a:endParaRPr lang="en-US"/>
+          </a:p>
+        </p:txBody>
+      </p:sp>
     </p:spTree>
     <p:extLst>
       <p:ext uri="{BB962C8B-B14F-4D97-AF65-F5344CB8AC3E}">
@@ -8201,6 +9560,53 @@
           </a:p>
         </p:txBody>
       </p:sp>
+      <p:sp>
+        <p:nvSpPr>
+          <p:cNvPr id="4" name="Footer Placeholder 3"/>
+          <p:cNvSpPr>
+            <a:spLocks noGrp="1"/>
+          </p:cNvSpPr>
+          <p:nvPr>
+            <p:ph type="ftr" sz="quarter" idx="11"/>
+          </p:nvPr>
+        </p:nvSpPr>
+        <p:spPr/>
+        <p:txBody>
+          <a:bodyPr/>
+          <a:lstStyle/>
+          <a:p>
+            <a:r>
+              <a:rPr lang="en-US" smtClean="0"/>
+              <a:t>Ashim Lamichhane</a:t>
+            </a:r>
+            <a:endParaRPr lang="en-US"/>
+          </a:p>
+        </p:txBody>
+      </p:sp>
+      <p:sp>
+        <p:nvSpPr>
+          <p:cNvPr id="5" name="Slide Number Placeholder 4"/>
+          <p:cNvSpPr>
+            <a:spLocks noGrp="1"/>
+          </p:cNvSpPr>
+          <p:nvPr>
+            <p:ph type="sldNum" sz="quarter" idx="12"/>
+          </p:nvPr>
+        </p:nvSpPr>
+        <p:spPr/>
+        <p:txBody>
+          <a:bodyPr/>
+          <a:lstStyle/>
+          <a:p>
+            <a:fld id="{B6F15528-21DE-4FAA-801E-634DDDAF4B2B}" type="slidenum">
+              <a:rPr lang="en-US" smtClean="0"/>
+              <a:pPr/>
+              <a:t>6</a:t>
+            </a:fld>
+            <a:endParaRPr lang="en-US"/>
+          </a:p>
+        </p:txBody>
+      </p:sp>
     </p:spTree>
     <p:extLst>
       <p:ext uri="{BB962C8B-B14F-4D97-AF65-F5344CB8AC3E}">
@@ -8394,6 +9800,53 @@
           </a:p>
         </p:txBody>
       </p:sp>
+      <p:sp>
+        <p:nvSpPr>
+          <p:cNvPr id="4" name="Footer Placeholder 3"/>
+          <p:cNvSpPr>
+            <a:spLocks noGrp="1"/>
+          </p:cNvSpPr>
+          <p:nvPr>
+            <p:ph type="ftr" sz="quarter" idx="11"/>
+          </p:nvPr>
+        </p:nvSpPr>
+        <p:spPr/>
+        <p:txBody>
+          <a:bodyPr/>
+          <a:lstStyle/>
+          <a:p>
+            <a:r>
+              <a:rPr lang="en-US" smtClean="0"/>
+              <a:t>Ashim Lamichhane</a:t>
+            </a:r>
+            <a:endParaRPr lang="en-US"/>
+          </a:p>
+        </p:txBody>
+      </p:sp>
+      <p:sp>
+        <p:nvSpPr>
+          <p:cNvPr id="5" name="Slide Number Placeholder 4"/>
+          <p:cNvSpPr>
+            <a:spLocks noGrp="1"/>
+          </p:cNvSpPr>
+          <p:nvPr>
+            <p:ph type="sldNum" sz="quarter" idx="12"/>
+          </p:nvPr>
+        </p:nvSpPr>
+        <p:spPr/>
+        <p:txBody>
+          <a:bodyPr/>
+          <a:lstStyle/>
+          <a:p>
+            <a:fld id="{B6F15528-21DE-4FAA-801E-634DDDAF4B2B}" type="slidenum">
+              <a:rPr lang="en-US" smtClean="0"/>
+              <a:pPr/>
+              <a:t>7</a:t>
+            </a:fld>
+            <a:endParaRPr lang="en-US"/>
+          </a:p>
+        </p:txBody>
+      </p:sp>
     </p:spTree>
     <p:extLst>
       <p:ext uri="{BB962C8B-B14F-4D97-AF65-F5344CB8AC3E}">
@@ -8538,6 +9991,53 @@
           </a:p>
         </p:txBody>
       </p:sp>
+      <p:sp>
+        <p:nvSpPr>
+          <p:cNvPr id="4" name="Footer Placeholder 3"/>
+          <p:cNvSpPr>
+            <a:spLocks noGrp="1"/>
+          </p:cNvSpPr>
+          <p:nvPr>
+            <p:ph type="ftr" sz="quarter" idx="11"/>
+          </p:nvPr>
+        </p:nvSpPr>
+        <p:spPr/>
+        <p:txBody>
+          <a:bodyPr/>
+          <a:lstStyle/>
+          <a:p>
+            <a:r>
+              <a:rPr lang="en-US" smtClean="0"/>
+              <a:t>Ashim Lamichhane</a:t>
+            </a:r>
+            <a:endParaRPr lang="en-US"/>
+          </a:p>
+        </p:txBody>
+      </p:sp>
+      <p:sp>
+        <p:nvSpPr>
+          <p:cNvPr id="5" name="Slide Number Placeholder 4"/>
+          <p:cNvSpPr>
+            <a:spLocks noGrp="1"/>
+          </p:cNvSpPr>
+          <p:nvPr>
+            <p:ph type="sldNum" sz="quarter" idx="12"/>
+          </p:nvPr>
+        </p:nvSpPr>
+        <p:spPr/>
+        <p:txBody>
+          <a:bodyPr/>
+          <a:lstStyle/>
+          <a:p>
+            <a:fld id="{B6F15528-21DE-4FAA-801E-634DDDAF4B2B}" type="slidenum">
+              <a:rPr lang="en-US" smtClean="0"/>
+              <a:pPr/>
+              <a:t>8</a:t>
+            </a:fld>
+            <a:endParaRPr lang="en-US"/>
+          </a:p>
+        </p:txBody>
+      </p:sp>
     </p:spTree>
     <p:extLst>
       <p:ext uri="{BB962C8B-B14F-4D97-AF65-F5344CB8AC3E}">
@@ -8678,6 +10178,53 @@
               <a:t>Field width [Optional]</a:t>
             </a:r>
             <a:endParaRPr lang="en-US" sz="2400" dirty="0"/>
+          </a:p>
+        </p:txBody>
+      </p:sp>
+      <p:sp>
+        <p:nvSpPr>
+          <p:cNvPr id="2" name="Footer Placeholder 1"/>
+          <p:cNvSpPr>
+            <a:spLocks noGrp="1"/>
+          </p:cNvSpPr>
+          <p:nvPr>
+            <p:ph type="ftr" sz="quarter" idx="11"/>
+          </p:nvPr>
+        </p:nvSpPr>
+        <p:spPr/>
+        <p:txBody>
+          <a:bodyPr/>
+          <a:lstStyle/>
+          <a:p>
+            <a:r>
+              <a:rPr lang="en-US" smtClean="0"/>
+              <a:t>Ashim Lamichhane</a:t>
+            </a:r>
+            <a:endParaRPr lang="en-US"/>
+          </a:p>
+        </p:txBody>
+      </p:sp>
+      <p:sp>
+        <p:nvSpPr>
+          <p:cNvPr id="4" name="Slide Number Placeholder 3"/>
+          <p:cNvSpPr>
+            <a:spLocks noGrp="1"/>
+          </p:cNvSpPr>
+          <p:nvPr>
+            <p:ph type="sldNum" sz="quarter" idx="12"/>
+          </p:nvPr>
+        </p:nvSpPr>
+        <p:spPr/>
+        <p:txBody>
+          <a:bodyPr/>
+          <a:lstStyle/>
+          <a:p>
+            <a:fld id="{B6F15528-21DE-4FAA-801E-634DDDAF4B2B}" type="slidenum">
+              <a:rPr lang="en-US" smtClean="0"/>
+              <a:pPr/>
+              <a:t>9</a:t>
+            </a:fld>
+            <a:endParaRPr lang="en-US"/>
           </a:p>
         </p:txBody>
       </p:sp>

</xml_diff>